<commit_message>
Update presentation task 01
</commit_message>
<xml_diff>
--- a/doc/task01/presentation_design_thinking.pptx
+++ b/doc/task01/presentation_design_thinking.pptx
@@ -5,7 +5,7 @@
     <p:sldMasterId id="2147483744" r:id="rId1"/>
   </p:sldMasterIdLst>
   <p:notesMasterIdLst>
-    <p:notesMasterId r:id="rId26"/>
+    <p:notesMasterId r:id="rId27"/>
   </p:notesMasterIdLst>
   <p:sldIdLst>
     <p:sldId id="256" r:id="rId2"/>
@@ -31,7 +31,8 @@
     <p:sldId id="276" r:id="rId22"/>
     <p:sldId id="277" r:id="rId23"/>
     <p:sldId id="278" r:id="rId24"/>
-    <p:sldId id="279" r:id="rId25"/>
+    <p:sldId id="280" r:id="rId25"/>
+    <p:sldId id="279" r:id="rId26"/>
   </p:sldIdLst>
   <p:sldSz cx="12192000" cy="6858000"/>
   <p:notesSz cx="6858000" cy="9144000"/>
@@ -130,6 +131,11 @@
       </a:defRPr>
     </a:lvl9pPr>
   </p:defaultTextStyle>
+  <p:extLst>
+    <p:ext uri="{EFAFB233-063F-42B5-8137-9DF3F51BA10A}">
+      <p15:sldGuideLst xmlns:p15="http://schemas.microsoft.com/office/powerpoint/2012/main"/>
+    </p:ext>
+  </p:extLst>
 </p:presentation>
 </file>
 
@@ -215,7 +221,7 @@
           <a:p>
             <a:fld id="{0C954AB1-BA64-40F1-B2DB-48B80E232211}" type="datetimeFigureOut">
               <a:rPr lang="de-CH" smtClean="0"/>
-              <a:t>29.03.2020</a:t>
+              <a:t>30.03.2020</a:t>
             </a:fld>
             <a:endParaRPr lang="de-CH"/>
           </a:p>
@@ -279,35 +285,35 @@
           <a:p>
             <a:pPr lvl="0"/>
             <a:r>
-              <a:rPr lang="de-DE" smtClean="0"/>
+              <a:rPr lang="de-DE"/>
               <a:t>Formatvorlagen des Textmasters bearbeiten</a:t>
             </a:r>
           </a:p>
           <a:p>
             <a:pPr lvl="1"/>
             <a:r>
-              <a:rPr lang="de-DE" smtClean="0"/>
+              <a:rPr lang="de-DE"/>
               <a:t>Zweite Ebene</a:t>
             </a:r>
           </a:p>
           <a:p>
             <a:pPr lvl="2"/>
             <a:r>
-              <a:rPr lang="de-DE" smtClean="0"/>
+              <a:rPr lang="de-DE"/>
               <a:t>Dritte Ebene</a:t>
             </a:r>
           </a:p>
           <a:p>
             <a:pPr lvl="3"/>
             <a:r>
-              <a:rPr lang="de-DE" smtClean="0"/>
+              <a:rPr lang="de-DE"/>
               <a:t>Vierte Ebene</a:t>
             </a:r>
           </a:p>
           <a:p>
             <a:pPr lvl="4"/>
             <a:r>
-              <a:rPr lang="de-DE" smtClean="0"/>
+              <a:rPr lang="de-DE"/>
               <a:t>Fünfte Ebene</a:t>
             </a:r>
             <a:endParaRPr lang="de-CH"/>
@@ -612,103 +618,103 @@
           <a:lstStyle/>
           <a:p>
             <a:r>
-              <a:rPr lang="de-CH" dirty="0" err="1" smtClean="0"/>
+              <a:rPr lang="de-CH" dirty="0" err="1"/>
               <a:t>health</a:t>
             </a:r>
             <a:r>
-              <a:rPr lang="de-CH" dirty="0" smtClean="0"/>
+              <a:rPr lang="de-CH" dirty="0"/>
               <a:t> </a:t>
             </a:r>
             <a:r>
-              <a:rPr lang="de-CH" dirty="0" err="1" smtClean="0"/>
+              <a:rPr lang="de-CH" dirty="0" err="1"/>
               <a:t>visitors</a:t>
             </a:r>
             <a:r>
-              <a:rPr lang="de-CH" dirty="0" smtClean="0"/>
+              <a:rPr lang="de-CH" dirty="0"/>
               <a:t> -&gt; konkret Spitex</a:t>
             </a:r>
           </a:p>
           <a:p>
-            <a:endParaRPr lang="de-CH" dirty="0" smtClean="0"/>
-          </a:p>
-          <a:p>
-            <a:r>
-              <a:rPr lang="de-CH" dirty="0" smtClean="0"/>
+            <a:endParaRPr lang="de-CH" dirty="0"/>
+          </a:p>
+          <a:p>
+            <a:r>
+              <a:rPr lang="de-CH" dirty="0"/>
               <a:t>Grund</a:t>
             </a:r>
             <a:r>
-              <a:rPr lang="de-CH" baseline="0" dirty="0" smtClean="0"/>
+              <a:rPr lang="de-CH" baseline="0" dirty="0"/>
               <a:t> Leistung -&gt; Klienten wecken, Pflegen </a:t>
             </a:r>
             <a:r>
-              <a:rPr lang="de-CH" baseline="0" dirty="0" err="1" smtClean="0"/>
+              <a:rPr lang="de-CH" baseline="0" dirty="0" err="1"/>
               <a:t>usw</a:t>
             </a:r>
-            <a:endParaRPr lang="de-CH" baseline="0" dirty="0" smtClean="0"/>
-          </a:p>
-          <a:p>
-            <a:r>
-              <a:rPr lang="de-CH" baseline="0" dirty="0" smtClean="0"/>
+            <a:endParaRPr lang="de-CH" baseline="0" dirty="0"/>
+          </a:p>
+          <a:p>
+            <a:r>
+              <a:rPr lang="de-CH" baseline="0" dirty="0"/>
               <a:t>Hauswirtschaft -&gt; Putzen, Kochen, Arztbesuche </a:t>
             </a:r>
             <a:r>
-              <a:rPr lang="de-CH" baseline="0" dirty="0" err="1" smtClean="0"/>
+              <a:rPr lang="de-CH" baseline="0" dirty="0" err="1"/>
               <a:t>etc</a:t>
             </a:r>
-            <a:endParaRPr lang="de-CH" baseline="0" dirty="0" smtClean="0"/>
-          </a:p>
-          <a:p>
-            <a:r>
-              <a:rPr lang="de-CH" baseline="0" dirty="0" smtClean="0"/>
+            <a:endParaRPr lang="de-CH" baseline="0" dirty="0"/>
+          </a:p>
+          <a:p>
+            <a:r>
+              <a:rPr lang="de-CH" baseline="0" dirty="0"/>
               <a:t>Wichtig für Versicherung</a:t>
             </a:r>
           </a:p>
           <a:p>
-            <a:endParaRPr lang="de-CH" baseline="0" dirty="0" smtClean="0"/>
-          </a:p>
-          <a:p>
-            <a:r>
-              <a:rPr lang="de-CH" baseline="0" dirty="0" smtClean="0"/>
+            <a:endParaRPr lang="de-CH" baseline="0" dirty="0"/>
+          </a:p>
+          <a:p>
+            <a:r>
+              <a:rPr lang="de-CH" baseline="0" dirty="0"/>
               <a:t>Bei Depressiven Patienten werden Arbeiten zusammen erledigt</a:t>
             </a:r>
           </a:p>
           <a:p>
-            <a:endParaRPr lang="de-CH" baseline="0" dirty="0" smtClean="0"/>
-          </a:p>
-          <a:p>
-            <a:r>
-              <a:rPr lang="de-CH" baseline="0" dirty="0" smtClean="0"/>
+            <a:endParaRPr lang="de-CH" baseline="0" dirty="0"/>
+          </a:p>
+          <a:p>
+            <a:r>
+              <a:rPr lang="de-CH" baseline="0" dirty="0"/>
               <a:t>Pflegebericht muss erstellt werden über die erledigen Tätigkeiten -&gt; Klienten können die Arbeit auch verweigern</a:t>
             </a:r>
           </a:p>
           <a:p>
             <a:r>
-              <a:rPr lang="de-CH" baseline="0" dirty="0" smtClean="0"/>
+              <a:rPr lang="de-CH" baseline="0" dirty="0"/>
               <a:t>Je nach Unternehmung geschieht dies bereits Elektronisch (iPad)</a:t>
             </a:r>
           </a:p>
           <a:p>
-            <a:endParaRPr lang="de-CH" baseline="0" dirty="0" smtClean="0"/>
-          </a:p>
-          <a:p>
-            <a:r>
-              <a:rPr lang="de-CH" baseline="0" dirty="0" smtClean="0"/>
+            <a:endParaRPr lang="de-CH" baseline="0" dirty="0"/>
+          </a:p>
+          <a:p>
+            <a:r>
+              <a:rPr lang="de-CH" baseline="0" dirty="0"/>
               <a:t>Infos über depressive Patienten werden nicht im </a:t>
             </a:r>
             <a:r>
-              <a:rPr lang="de-CH" baseline="0" dirty="0" err="1" smtClean="0"/>
+              <a:rPr lang="de-CH" baseline="0" dirty="0" err="1"/>
               <a:t>Kardex</a:t>
             </a:r>
             <a:r>
-              <a:rPr lang="de-CH" baseline="0" dirty="0" smtClean="0"/>
+              <a:rPr lang="de-CH" baseline="0" dirty="0"/>
               <a:t>, sondern getrennt gehalten, da das </a:t>
             </a:r>
             <a:r>
-              <a:rPr lang="de-CH" baseline="0" dirty="0" err="1" smtClean="0"/>
+              <a:rPr lang="de-CH" baseline="0" dirty="0" err="1"/>
               <a:t>Kardex</a:t>
             </a:r>
             <a:r>
-              <a:rPr lang="de-CH" baseline="0" dirty="0" smtClean="0"/>
+              <a:rPr lang="de-CH" baseline="0" dirty="0"/>
               <a:t> immer beim Klienten bleibt</a:t>
             </a:r>
           </a:p>
@@ -963,19 +969,19 @@
           <a:lstStyle/>
           <a:p>
             <a:r>
-              <a:rPr lang="de-CH" dirty="0" smtClean="0"/>
+              <a:rPr lang="de-CH" dirty="0"/>
               <a:t>Abgleich der Screens mit</a:t>
             </a:r>
             <a:r>
-              <a:rPr lang="de-CH" baseline="0" dirty="0" smtClean="0"/>
+              <a:rPr lang="de-CH" baseline="0" dirty="0"/>
               <a:t> den </a:t>
             </a:r>
             <a:r>
-              <a:rPr lang="de-CH" baseline="0" dirty="0" err="1" smtClean="0"/>
+              <a:rPr lang="de-CH" baseline="0" dirty="0" err="1"/>
               <a:t>Personas</a:t>
             </a:r>
             <a:r>
-              <a:rPr lang="de-CH" baseline="0" dirty="0" smtClean="0"/>
+              <a:rPr lang="de-CH" baseline="0" dirty="0"/>
               <a:t> -&gt; </a:t>
             </a:r>
             <a:endParaRPr lang="de-CH" dirty="0"/>
@@ -1063,11 +1069,11 @@
           <a:lstStyle/>
           <a:p>
             <a:r>
-              <a:rPr lang="de-CH" dirty="0" smtClean="0"/>
+              <a:rPr lang="de-CH" dirty="0"/>
               <a:t>auf die bestehenden Interview Partner</a:t>
             </a:r>
             <a:r>
-              <a:rPr lang="de-CH" baseline="0" dirty="0" smtClean="0"/>
+              <a:rPr lang="de-CH" baseline="0" dirty="0"/>
               <a:t> beschränkt</a:t>
             </a:r>
             <a:endParaRPr lang="de-CH" dirty="0"/>
@@ -1155,10 +1161,9 @@
           <a:lstStyle/>
           <a:p>
             <a:r>
-              <a:rPr lang="de-CH" dirty="0" smtClean="0"/>
+              <a:rPr lang="de-CH" dirty="0"/>
               <a:t>Zusammengefasst eine Mobile Lösung</a:t>
             </a:r>
-            <a:endParaRPr lang="de-CH" dirty="0"/>
           </a:p>
         </p:txBody>
       </p:sp>
@@ -1189,6 +1194,94 @@
     <p:extLst>
       <p:ext uri="{BB962C8B-B14F-4D97-AF65-F5344CB8AC3E}">
         <p14:creationId xmlns:p14="http://schemas.microsoft.com/office/powerpoint/2010/main" val="762519947"/>
+      </p:ext>
+    </p:extLst>
+  </p:cSld>
+  <p:clrMapOvr>
+    <a:masterClrMapping/>
+  </p:clrMapOvr>
+</p:notes>
+</file>
+
+<file path=ppt/notesSlides/notesSlide8.xml><?xml version="1.0" encoding="utf-8"?>
+<p:notes xmlns:a="http://schemas.openxmlformats.org/drawingml/2006/main" xmlns:r="http://schemas.openxmlformats.org/officeDocument/2006/relationships" xmlns:p="http://schemas.openxmlformats.org/presentationml/2006/main">
+  <p:cSld>
+    <p:spTree>
+      <p:nvGrpSpPr>
+        <p:cNvPr id="1" name=""/>
+        <p:cNvGrpSpPr/>
+        <p:nvPr/>
+      </p:nvGrpSpPr>
+      <p:grpSpPr>
+        <a:xfrm>
+          <a:off x="0" y="0"/>
+          <a:ext cx="0" cy="0"/>
+          <a:chOff x="0" y="0"/>
+          <a:chExt cx="0" cy="0"/>
+        </a:xfrm>
+      </p:grpSpPr>
+      <p:sp>
+        <p:nvSpPr>
+          <p:cNvPr id="2" name="Folienbildplatzhalter 1"/>
+          <p:cNvSpPr>
+            <a:spLocks noGrp="1" noRot="1" noChangeAspect="1"/>
+          </p:cNvSpPr>
+          <p:nvPr>
+            <p:ph type="sldImg"/>
+          </p:nvPr>
+        </p:nvSpPr>
+        <p:spPr/>
+      </p:sp>
+      <p:sp>
+        <p:nvSpPr>
+          <p:cNvPr id="3" name="Notizenplatzhalter 2"/>
+          <p:cNvSpPr>
+            <a:spLocks noGrp="1"/>
+          </p:cNvSpPr>
+          <p:nvPr>
+            <p:ph type="body" idx="1"/>
+          </p:nvPr>
+        </p:nvSpPr>
+        <p:spPr/>
+        <p:txBody>
+          <a:bodyPr/>
+          <a:lstStyle/>
+          <a:p>
+            <a:r>
+              <a:rPr lang="de-CH" dirty="0"/>
+              <a:t>Gute Struktur -&gt; Klar was gemacht werden muss</a:t>
+            </a:r>
+            <a:endParaRPr lang="de-DE" dirty="0"/>
+          </a:p>
+        </p:txBody>
+      </p:sp>
+      <p:sp>
+        <p:nvSpPr>
+          <p:cNvPr id="4" name="Foliennummernplatzhalter 3"/>
+          <p:cNvSpPr>
+            <a:spLocks noGrp="1"/>
+          </p:cNvSpPr>
+          <p:nvPr>
+            <p:ph type="sldNum" sz="quarter" idx="5"/>
+          </p:nvPr>
+        </p:nvSpPr>
+        <p:spPr/>
+        <p:txBody>
+          <a:bodyPr/>
+          <a:lstStyle/>
+          <a:p>
+            <a:fld id="{93F22D43-27F5-48B5-A4C5-9F7AEDFC0968}" type="slidenum">
+              <a:rPr lang="de-CH" smtClean="0"/>
+              <a:t>24</a:t>
+            </a:fld>
+            <a:endParaRPr lang="de-CH"/>
+          </a:p>
+        </p:txBody>
+      </p:sp>
+    </p:spTree>
+    <p:extLst>
+      <p:ext uri="{BB962C8B-B14F-4D97-AF65-F5344CB8AC3E}">
+        <p14:creationId xmlns:p14="http://schemas.microsoft.com/office/powerpoint/2010/main" val="3556520494"/>
       </p:ext>
     </p:extLst>
   </p:cSld>
@@ -1284,7 +1377,7 @@
           </a:lstStyle>
           <a:p>
             <a:r>
-              <a:rPr lang="de-DE" smtClean="0"/>
+              <a:rPr lang="de-DE"/>
               <a:t>Titelmasterformat durch Klicken bearbeiten</a:t>
             </a:r>
             <a:endParaRPr lang="en-US" dirty="0"/>
@@ -1403,7 +1496,7 @@
           </a:lstStyle>
           <a:p>
             <a:r>
-              <a:rPr lang="de-DE" smtClean="0"/>
+              <a:rPr lang="de-DE"/>
               <a:t>Formatvorlage des Untertitelmasters durch Klicken bearbeiten</a:t>
             </a:r>
             <a:endParaRPr lang="en-US" dirty="0"/>
@@ -1443,7 +1536,7 @@
           <a:p>
             <a:fld id="{969CBD81-1743-42D4-9A81-3BB60815A02B}" type="datetimeFigureOut">
               <a:rPr lang="de-CH" smtClean="0"/>
-              <a:t>29.03.2020</a:t>
+              <a:t>30.03.2020</a:t>
             </a:fld>
             <a:endParaRPr lang="de-CH"/>
           </a:p>
@@ -1613,7 +1706,7 @@
           <a:lstStyle/>
           <a:p>
             <a:r>
-              <a:rPr lang="de-DE" smtClean="0"/>
+              <a:rPr lang="de-DE"/>
               <a:t>Titelmasterformat durch Klicken bearbeiten</a:t>
             </a:r>
             <a:endParaRPr lang="en-US" dirty="0"/>
@@ -1653,35 +1746,35 @@
           <a:p>
             <a:pPr lvl="0"/>
             <a:r>
-              <a:rPr lang="de-DE" smtClean="0"/>
+              <a:rPr lang="de-DE"/>
               <a:t>Formatvorlagen des Textmasters bearbeiten</a:t>
             </a:r>
           </a:p>
           <a:p>
             <a:pPr lvl="1"/>
             <a:r>
-              <a:rPr lang="de-DE" smtClean="0"/>
+              <a:rPr lang="de-DE"/>
               <a:t>Zweite Ebene</a:t>
             </a:r>
           </a:p>
           <a:p>
             <a:pPr lvl="2"/>
             <a:r>
-              <a:rPr lang="de-DE" smtClean="0"/>
+              <a:rPr lang="de-DE"/>
               <a:t>Dritte Ebene</a:t>
             </a:r>
           </a:p>
           <a:p>
             <a:pPr lvl="3"/>
             <a:r>
-              <a:rPr lang="de-DE" smtClean="0"/>
+              <a:rPr lang="de-DE"/>
               <a:t>Vierte Ebene</a:t>
             </a:r>
           </a:p>
           <a:p>
             <a:pPr lvl="4"/>
             <a:r>
-              <a:rPr lang="de-DE" smtClean="0"/>
+              <a:rPr lang="de-DE"/>
               <a:t>Fünfte Ebene</a:t>
             </a:r>
             <a:endParaRPr lang="en-US" dirty="0"/>
@@ -1705,7 +1798,7 @@
           <a:p>
             <a:fld id="{969CBD81-1743-42D4-9A81-3BB60815A02B}" type="datetimeFigureOut">
               <a:rPr lang="de-CH" smtClean="0"/>
-              <a:t>29.03.2020</a:t>
+              <a:t>30.03.2020</a:t>
             </a:fld>
             <a:endParaRPr lang="de-CH"/>
           </a:p>
@@ -1843,7 +1936,7 @@
           <a:lstStyle/>
           <a:p>
             <a:r>
-              <a:rPr lang="de-DE" smtClean="0"/>
+              <a:rPr lang="de-DE"/>
               <a:t>Titelmasterformat durch Klicken bearbeiten</a:t>
             </a:r>
             <a:endParaRPr lang="en-US" dirty="0"/>
@@ -1872,35 +1965,35 @@
           <a:p>
             <a:pPr lvl="0"/>
             <a:r>
-              <a:rPr lang="de-DE" smtClean="0"/>
+              <a:rPr lang="de-DE"/>
               <a:t>Formatvorlagen des Textmasters bearbeiten</a:t>
             </a:r>
           </a:p>
           <a:p>
             <a:pPr lvl="1"/>
             <a:r>
-              <a:rPr lang="de-DE" smtClean="0"/>
+              <a:rPr lang="de-DE"/>
               <a:t>Zweite Ebene</a:t>
             </a:r>
           </a:p>
           <a:p>
             <a:pPr lvl="2"/>
             <a:r>
-              <a:rPr lang="de-DE" smtClean="0"/>
+              <a:rPr lang="de-DE"/>
               <a:t>Dritte Ebene</a:t>
             </a:r>
           </a:p>
           <a:p>
             <a:pPr lvl="3"/>
             <a:r>
-              <a:rPr lang="de-DE" smtClean="0"/>
+              <a:rPr lang="de-DE"/>
               <a:t>Vierte Ebene</a:t>
             </a:r>
           </a:p>
           <a:p>
             <a:pPr lvl="4"/>
             <a:r>
-              <a:rPr lang="de-DE" smtClean="0"/>
+              <a:rPr lang="de-DE"/>
               <a:t>Fünfte Ebene</a:t>
             </a:r>
             <a:endParaRPr lang="en-US" dirty="0"/>
@@ -1940,7 +2033,7 @@
           <a:p>
             <a:fld id="{969CBD81-1743-42D4-9A81-3BB60815A02B}" type="datetimeFigureOut">
               <a:rPr lang="de-CH" smtClean="0"/>
-              <a:t>29.03.2020</a:t>
+              <a:t>30.03.2020</a:t>
             </a:fld>
             <a:endParaRPr lang="de-CH"/>
           </a:p>
@@ -2099,7 +2192,7 @@
           <a:lstStyle/>
           <a:p>
             <a:r>
-              <a:rPr lang="de-DE" smtClean="0"/>
+              <a:rPr lang="de-DE"/>
               <a:t>Titelmasterformat durch Klicken bearbeiten</a:t>
             </a:r>
             <a:endParaRPr lang="en-US" dirty="0"/>
@@ -2128,35 +2221,35 @@
           <a:p>
             <a:pPr lvl="0"/>
             <a:r>
-              <a:rPr lang="de-DE" smtClean="0"/>
+              <a:rPr lang="de-DE"/>
               <a:t>Formatvorlagen des Textmasters bearbeiten</a:t>
             </a:r>
           </a:p>
           <a:p>
             <a:pPr lvl="1"/>
             <a:r>
-              <a:rPr lang="de-DE" smtClean="0"/>
+              <a:rPr lang="de-DE"/>
               <a:t>Zweite Ebene</a:t>
             </a:r>
           </a:p>
           <a:p>
             <a:pPr lvl="2"/>
             <a:r>
-              <a:rPr lang="de-DE" smtClean="0"/>
+              <a:rPr lang="de-DE"/>
               <a:t>Dritte Ebene</a:t>
             </a:r>
           </a:p>
           <a:p>
             <a:pPr lvl="3"/>
             <a:r>
-              <a:rPr lang="de-DE" smtClean="0"/>
+              <a:rPr lang="de-DE"/>
               <a:t>Vierte Ebene</a:t>
             </a:r>
           </a:p>
           <a:p>
             <a:pPr lvl="4"/>
             <a:r>
-              <a:rPr lang="de-DE" smtClean="0"/>
+              <a:rPr lang="de-DE"/>
               <a:t>Fünfte Ebene</a:t>
             </a:r>
             <a:endParaRPr lang="en-US" dirty="0"/>
@@ -2180,7 +2273,7 @@
           <a:p>
             <a:fld id="{969CBD81-1743-42D4-9A81-3BB60815A02B}" type="datetimeFigureOut">
               <a:rPr lang="de-CH" smtClean="0"/>
-              <a:t>29.03.2020</a:t>
+              <a:t>30.03.2020</a:t>
             </a:fld>
             <a:endParaRPr lang="de-CH"/>
           </a:p>
@@ -2333,7 +2426,7 @@
           </a:lstStyle>
           <a:p>
             <a:r>
-              <a:rPr lang="de-DE" smtClean="0"/>
+              <a:rPr lang="de-DE"/>
               <a:t>Titelmasterformat durch Klicken bearbeiten</a:t>
             </a:r>
             <a:endParaRPr lang="en-US" dirty="0"/>
@@ -2453,7 +2546,7 @@
           <a:p>
             <a:pPr lvl="0"/>
             <a:r>
-              <a:rPr lang="de-DE" smtClean="0"/>
+              <a:rPr lang="de-DE"/>
               <a:t>Formatvorlagen des Textmasters bearbeiten</a:t>
             </a:r>
           </a:p>
@@ -2487,7 +2580,7 @@
           <a:p>
             <a:fld id="{969CBD81-1743-42D4-9A81-3BB60815A02B}" type="datetimeFigureOut">
               <a:rPr lang="de-CH" smtClean="0"/>
-              <a:t>29.03.2020</a:t>
+              <a:t>30.03.2020</a:t>
             </a:fld>
             <a:endParaRPr lang="de-CH"/>
           </a:p>
@@ -2647,7 +2740,7 @@
           <a:lstStyle/>
           <a:p>
             <a:r>
-              <a:rPr lang="de-DE" smtClean="0"/>
+              <a:rPr lang="de-DE"/>
               <a:t>Titelmasterformat durch Klicken bearbeiten</a:t>
             </a:r>
             <a:endParaRPr lang="en-US" dirty="0"/>
@@ -2678,35 +2771,35 @@
           <a:p>
             <a:pPr lvl="0"/>
             <a:r>
-              <a:rPr lang="de-DE" smtClean="0"/>
+              <a:rPr lang="de-DE"/>
               <a:t>Formatvorlagen des Textmasters bearbeiten</a:t>
             </a:r>
           </a:p>
           <a:p>
             <a:pPr lvl="1"/>
             <a:r>
-              <a:rPr lang="de-DE" smtClean="0"/>
+              <a:rPr lang="de-DE"/>
               <a:t>Zweite Ebene</a:t>
             </a:r>
           </a:p>
           <a:p>
             <a:pPr lvl="2"/>
             <a:r>
-              <a:rPr lang="de-DE" smtClean="0"/>
+              <a:rPr lang="de-DE"/>
               <a:t>Dritte Ebene</a:t>
             </a:r>
           </a:p>
           <a:p>
             <a:pPr lvl="3"/>
             <a:r>
-              <a:rPr lang="de-DE" smtClean="0"/>
+              <a:rPr lang="de-DE"/>
               <a:t>Vierte Ebene</a:t>
             </a:r>
           </a:p>
           <a:p>
             <a:pPr lvl="4"/>
             <a:r>
-              <a:rPr lang="de-DE" smtClean="0"/>
+              <a:rPr lang="de-DE"/>
               <a:t>Fünfte Ebene</a:t>
             </a:r>
             <a:endParaRPr lang="en-US" dirty="0"/>
@@ -2737,35 +2830,35 @@
           <a:p>
             <a:pPr lvl="0"/>
             <a:r>
-              <a:rPr lang="de-DE" smtClean="0"/>
+              <a:rPr lang="de-DE"/>
               <a:t>Formatvorlagen des Textmasters bearbeiten</a:t>
             </a:r>
           </a:p>
           <a:p>
             <a:pPr lvl="1"/>
             <a:r>
-              <a:rPr lang="de-DE" smtClean="0"/>
+              <a:rPr lang="de-DE"/>
               <a:t>Zweite Ebene</a:t>
             </a:r>
           </a:p>
           <a:p>
             <a:pPr lvl="2"/>
             <a:r>
-              <a:rPr lang="de-DE" smtClean="0"/>
+              <a:rPr lang="de-DE"/>
               <a:t>Dritte Ebene</a:t>
             </a:r>
           </a:p>
           <a:p>
             <a:pPr lvl="3"/>
             <a:r>
-              <a:rPr lang="de-DE" smtClean="0"/>
+              <a:rPr lang="de-DE"/>
               <a:t>Vierte Ebene</a:t>
             </a:r>
           </a:p>
           <a:p>
             <a:pPr lvl="4"/>
             <a:r>
-              <a:rPr lang="de-DE" smtClean="0"/>
+              <a:rPr lang="de-DE"/>
               <a:t>Fünfte Ebene</a:t>
             </a:r>
             <a:endParaRPr lang="en-US" dirty="0"/>
@@ -2789,7 +2882,7 @@
           <a:p>
             <a:fld id="{969CBD81-1743-42D4-9A81-3BB60815A02B}" type="datetimeFigureOut">
               <a:rPr lang="de-CH" smtClean="0"/>
-              <a:t>29.03.2020</a:t>
+              <a:t>30.03.2020</a:t>
             </a:fld>
             <a:endParaRPr lang="de-CH"/>
           </a:p>
@@ -2927,7 +3020,7 @@
           <a:lstStyle/>
           <a:p>
             <a:r>
-              <a:rPr lang="de-DE" smtClean="0"/>
+              <a:rPr lang="de-DE"/>
               <a:t>Titelmasterformat durch Klicken bearbeiten</a:t>
             </a:r>
             <a:endParaRPr lang="en-US" dirty="0"/>
@@ -2999,7 +3092,7 @@
           <a:p>
             <a:pPr lvl="0"/>
             <a:r>
-              <a:rPr lang="de-DE" smtClean="0"/>
+              <a:rPr lang="de-DE"/>
               <a:t>Formatvorlagen des Textmasters bearbeiten</a:t>
             </a:r>
           </a:p>
@@ -3029,35 +3122,35 @@
           <a:p>
             <a:pPr lvl="0"/>
             <a:r>
-              <a:rPr lang="de-DE" smtClean="0"/>
+              <a:rPr lang="de-DE"/>
               <a:t>Formatvorlagen des Textmasters bearbeiten</a:t>
             </a:r>
           </a:p>
           <a:p>
             <a:pPr lvl="1"/>
             <a:r>
-              <a:rPr lang="de-DE" smtClean="0"/>
+              <a:rPr lang="de-DE"/>
               <a:t>Zweite Ebene</a:t>
             </a:r>
           </a:p>
           <a:p>
             <a:pPr lvl="2"/>
             <a:r>
-              <a:rPr lang="de-DE" smtClean="0"/>
+              <a:rPr lang="de-DE"/>
               <a:t>Dritte Ebene</a:t>
             </a:r>
           </a:p>
           <a:p>
             <a:pPr lvl="3"/>
             <a:r>
-              <a:rPr lang="de-DE" smtClean="0"/>
+              <a:rPr lang="de-DE"/>
               <a:t>Vierte Ebene</a:t>
             </a:r>
           </a:p>
           <a:p>
             <a:pPr lvl="4"/>
             <a:r>
-              <a:rPr lang="de-DE" smtClean="0"/>
+              <a:rPr lang="de-DE"/>
               <a:t>Fünfte Ebene</a:t>
             </a:r>
             <a:endParaRPr lang="en-US" dirty="0"/>
@@ -3129,7 +3222,7 @@
           <a:p>
             <a:pPr lvl="0"/>
             <a:r>
-              <a:rPr lang="de-DE" smtClean="0"/>
+              <a:rPr lang="de-DE"/>
               <a:t>Formatvorlagen des Textmasters bearbeiten</a:t>
             </a:r>
           </a:p>
@@ -3159,35 +3252,35 @@
           <a:p>
             <a:pPr lvl="0"/>
             <a:r>
-              <a:rPr lang="de-DE" smtClean="0"/>
+              <a:rPr lang="de-DE"/>
               <a:t>Formatvorlagen des Textmasters bearbeiten</a:t>
             </a:r>
           </a:p>
           <a:p>
             <a:pPr lvl="1"/>
             <a:r>
-              <a:rPr lang="de-DE" smtClean="0"/>
+              <a:rPr lang="de-DE"/>
               <a:t>Zweite Ebene</a:t>
             </a:r>
           </a:p>
           <a:p>
             <a:pPr lvl="2"/>
             <a:r>
-              <a:rPr lang="de-DE" smtClean="0"/>
+              <a:rPr lang="de-DE"/>
               <a:t>Dritte Ebene</a:t>
             </a:r>
           </a:p>
           <a:p>
             <a:pPr lvl="3"/>
             <a:r>
-              <a:rPr lang="de-DE" smtClean="0"/>
+              <a:rPr lang="de-DE"/>
               <a:t>Vierte Ebene</a:t>
             </a:r>
           </a:p>
           <a:p>
             <a:pPr lvl="4"/>
             <a:r>
-              <a:rPr lang="de-DE" smtClean="0"/>
+              <a:rPr lang="de-DE"/>
               <a:t>Fünfte Ebene</a:t>
             </a:r>
             <a:endParaRPr lang="en-US" dirty="0"/>
@@ -3211,7 +3304,7 @@
           <a:p>
             <a:fld id="{969CBD81-1743-42D4-9A81-3BB60815A02B}" type="datetimeFigureOut">
               <a:rPr lang="de-CH" smtClean="0"/>
-              <a:t>29.03.2020</a:t>
+              <a:t>30.03.2020</a:t>
             </a:fld>
             <a:endParaRPr lang="de-CH"/>
           </a:p>
@@ -3349,7 +3442,7 @@
           <a:lstStyle/>
           <a:p>
             <a:r>
-              <a:rPr lang="de-DE" smtClean="0"/>
+              <a:rPr lang="de-DE"/>
               <a:t>Titelmasterformat durch Klicken bearbeiten</a:t>
             </a:r>
             <a:endParaRPr lang="en-US" dirty="0"/>
@@ -3373,7 +3466,7 @@
           <a:p>
             <a:fld id="{969CBD81-1743-42D4-9A81-3BB60815A02B}" type="datetimeFigureOut">
               <a:rPr lang="de-CH" smtClean="0"/>
-              <a:t>29.03.2020</a:t>
+              <a:t>30.03.2020</a:t>
             </a:fld>
             <a:endParaRPr lang="de-CH"/>
           </a:p>
@@ -3468,7 +3561,7 @@
           <a:p>
             <a:fld id="{969CBD81-1743-42D4-9A81-3BB60815A02B}" type="datetimeFigureOut">
               <a:rPr lang="de-CH" smtClean="0"/>
-              <a:t>29.03.2020</a:t>
+              <a:t>30.03.2020</a:t>
             </a:fld>
             <a:endParaRPr lang="de-CH"/>
           </a:p>
@@ -3617,7 +3710,7 @@
           </a:lstStyle>
           <a:p>
             <a:r>
-              <a:rPr lang="de-DE" smtClean="0"/>
+              <a:rPr lang="de-DE"/>
               <a:t>Titelmasterformat durch Klicken bearbeiten</a:t>
             </a:r>
             <a:endParaRPr lang="en-US" dirty="0"/>
@@ -3712,35 +3805,35 @@
           <a:p>
             <a:pPr lvl="0"/>
             <a:r>
-              <a:rPr lang="de-DE" smtClean="0"/>
+              <a:rPr lang="de-DE"/>
               <a:t>Formatvorlagen des Textmasters bearbeiten</a:t>
             </a:r>
           </a:p>
           <a:p>
             <a:pPr lvl="1"/>
             <a:r>
-              <a:rPr lang="de-DE" smtClean="0"/>
+              <a:rPr lang="de-DE"/>
               <a:t>Zweite Ebene</a:t>
             </a:r>
           </a:p>
           <a:p>
             <a:pPr lvl="2"/>
             <a:r>
-              <a:rPr lang="de-DE" smtClean="0"/>
+              <a:rPr lang="de-DE"/>
               <a:t>Dritte Ebene</a:t>
             </a:r>
           </a:p>
           <a:p>
             <a:pPr lvl="3"/>
             <a:r>
-              <a:rPr lang="de-DE" smtClean="0"/>
+              <a:rPr lang="de-DE"/>
               <a:t>Vierte Ebene</a:t>
             </a:r>
           </a:p>
           <a:p>
             <a:pPr lvl="4"/>
             <a:r>
-              <a:rPr lang="de-DE" smtClean="0"/>
+              <a:rPr lang="de-DE"/>
               <a:t>Fünfte Ebene</a:t>
             </a:r>
             <a:endParaRPr lang="en-US" dirty="0"/>
@@ -3812,7 +3905,7 @@
           <a:p>
             <a:pPr lvl="0"/>
             <a:r>
-              <a:rPr lang="de-DE" smtClean="0"/>
+              <a:rPr lang="de-DE"/>
               <a:t>Formatvorlagen des Textmasters bearbeiten</a:t>
             </a:r>
           </a:p>
@@ -3846,7 +3939,7 @@
           <a:p>
             <a:fld id="{969CBD81-1743-42D4-9A81-3BB60815A02B}" type="datetimeFigureOut">
               <a:rPr lang="de-CH" smtClean="0"/>
-              <a:t>29.03.2020</a:t>
+              <a:t>30.03.2020</a:t>
             </a:fld>
             <a:endParaRPr lang="de-CH"/>
           </a:p>
@@ -3977,7 +4070,7 @@
           </a:lstStyle>
           <a:p>
             <a:r>
-              <a:rPr lang="de-DE" smtClean="0"/>
+              <a:rPr lang="de-DE"/>
               <a:t>Titelmasterformat durch Klicken bearbeiten</a:t>
             </a:r>
             <a:endParaRPr lang="en-US" dirty="0"/>
@@ -4044,7 +4137,7 @@
           </a:lstStyle>
           <a:p>
             <a:r>
-              <a:rPr lang="de-DE" smtClean="0"/>
+              <a:rPr lang="de-DE"/>
               <a:t>Bild durch Klicken auf Symbol hinzufügen</a:t>
             </a:r>
             <a:endParaRPr lang="en-US" dirty="0"/>
@@ -4112,7 +4205,7 @@
           <a:p>
             <a:pPr lvl="0"/>
             <a:r>
-              <a:rPr lang="de-DE" smtClean="0"/>
+              <a:rPr lang="de-DE"/>
               <a:t>Formatvorlagen des Textmasters bearbeiten</a:t>
             </a:r>
           </a:p>
@@ -4135,7 +4228,7 @@
           <a:p>
             <a:fld id="{969CBD81-1743-42D4-9A81-3BB60815A02B}" type="datetimeFigureOut">
               <a:rPr lang="de-CH" smtClean="0"/>
-              <a:t>29.03.2020</a:t>
+              <a:t>30.03.2020</a:t>
             </a:fld>
             <a:endParaRPr lang="de-CH"/>
           </a:p>
@@ -4244,7 +4337,7 @@
           <a:lstStyle/>
           <a:p>
             <a:r>
-              <a:rPr lang="de-DE" smtClean="0"/>
+              <a:rPr lang="de-DE"/>
               <a:t>Titelmasterformat durch Klicken bearbeiten</a:t>
             </a:r>
             <a:endParaRPr lang="en-US" dirty="0"/>
@@ -4278,35 +4371,35 @@
           <a:p>
             <a:pPr lvl="0"/>
             <a:r>
-              <a:rPr lang="de-DE" smtClean="0"/>
+              <a:rPr lang="de-DE"/>
               <a:t>Formatvorlagen des Textmasters bearbeiten</a:t>
             </a:r>
           </a:p>
           <a:p>
             <a:pPr lvl="1"/>
             <a:r>
-              <a:rPr lang="de-DE" smtClean="0"/>
+              <a:rPr lang="de-DE"/>
               <a:t>Zweite Ebene</a:t>
             </a:r>
           </a:p>
           <a:p>
             <a:pPr lvl="2"/>
             <a:r>
-              <a:rPr lang="de-DE" smtClean="0"/>
+              <a:rPr lang="de-DE"/>
               <a:t>Dritte Ebene</a:t>
             </a:r>
           </a:p>
           <a:p>
             <a:pPr lvl="3"/>
             <a:r>
-              <a:rPr lang="de-DE" smtClean="0"/>
+              <a:rPr lang="de-DE"/>
               <a:t>Vierte Ebene</a:t>
             </a:r>
           </a:p>
           <a:p>
             <a:pPr lvl="4"/>
             <a:r>
-              <a:rPr lang="de-DE" smtClean="0"/>
+              <a:rPr lang="de-DE"/>
               <a:t>Fünfte Ebene</a:t>
             </a:r>
             <a:endParaRPr lang="en-US" dirty="0"/>
@@ -4346,7 +4439,7 @@
           <a:p>
             <a:fld id="{969CBD81-1743-42D4-9A81-3BB60815A02B}" type="datetimeFigureOut">
               <a:rPr lang="de-CH" smtClean="0"/>
-              <a:t>29.03.2020</a:t>
+              <a:t>30.03.2020</a:t>
             </a:fld>
             <a:endParaRPr lang="de-CH"/>
           </a:p>
@@ -4962,15 +5055,11 @@
           <a:bodyPr/>
           <a:lstStyle/>
           <a:p>
-            <a:r>
-              <a:rPr lang="de-CH" dirty="0"/>
-              <a:t/>
-            </a:r>
             <a:br>
               <a:rPr lang="de-CH" dirty="0"/>
             </a:br>
             <a:r>
-              <a:rPr lang="de-CH" dirty="0" smtClean="0"/>
+              <a:rPr lang="de-CH" dirty="0"/>
               <a:t>Design </a:t>
             </a:r>
             <a:r>
@@ -4979,14 +5068,10 @@
             </a:r>
             <a:r>
               <a:rPr lang="de-CH" dirty="0"/>
-              <a:t> </a:t>
-            </a:r>
-            <a:r>
-              <a:rPr lang="de-CH" dirty="0" smtClean="0"/>
-              <a:t>– Team </a:t>
-            </a:r>
-            <a:r>
-              <a:rPr lang="de-CH" dirty="0" err="1" smtClean="0"/>
+              <a:t> – Team </a:t>
+            </a:r>
+            <a:r>
+              <a:rPr lang="de-CH" dirty="0" err="1"/>
               <a:t>green</a:t>
             </a:r>
             <a:endParaRPr lang="de-CH" dirty="0"/>
@@ -5011,32 +5096,15 @@
           <a:lstStyle/>
           <a:p>
             <a:r>
-              <a:rPr lang="en-US" dirty="0" smtClean="0"/>
-              <a:t>BTI7081 </a:t>
-            </a:r>
-            <a:r>
               <a:rPr lang="en-US" dirty="0"/>
-              <a:t>Software Engineering and </a:t>
-            </a:r>
-            <a:r>
-              <a:rPr lang="en-US" dirty="0" smtClean="0"/>
-              <a:t>Design</a:t>
-            </a:r>
-          </a:p>
-          <a:p>
-            <a:r>
-              <a:rPr lang="de-CH" dirty="0" smtClean="0"/>
-              <a:t>CS2 </a:t>
-            </a:r>
-            <a:r>
-              <a:rPr lang="de-CH" dirty="0"/>
-              <a:t>- Task </a:t>
-            </a:r>
-            <a:r>
-              <a:rPr lang="de-CH" dirty="0" smtClean="0"/>
-              <a:t>01</a:t>
-            </a:r>
-            <a:endParaRPr lang="de-CH" dirty="0"/>
+              <a:t>BTI7081 Software Engineering and Design</a:t>
+            </a:r>
+          </a:p>
+          <a:p>
+            <a:r>
+              <a:rPr lang="de-CH" dirty="0"/>
+              <a:t>CS2 - Task 01</a:t>
+            </a:r>
           </a:p>
         </p:txBody>
       </p:sp>
@@ -5050,13 +5118,6 @@
   <p:clrMapOvr>
     <a:masterClrMapping/>
   </p:clrMapOvr>
-  <p:timing>
-    <p:tnLst>
-      <p:par>
-        <p:cTn id="1" dur="indefinite" restart="never" nodeType="tmRoot"/>
-      </p:par>
-    </p:tnLst>
-  </p:timing>
 </p:sld>
 </file>
 
@@ -5094,13 +5155,8 @@
           <a:p>
             <a:r>
               <a:rPr lang="de-CH" dirty="0"/>
-              <a:t>Persona - </a:t>
-            </a:r>
-            <a:r>
-              <a:rPr lang="de-CH" dirty="0" smtClean="0"/>
-              <a:t>Max</a:t>
-            </a:r>
-            <a:endParaRPr lang="de-CH" dirty="0"/>
+              <a:t>Persona - Max</a:t>
+            </a:r>
           </a:p>
         </p:txBody>
       </p:sp>
@@ -5127,15 +5183,14 @@
               <a:rPr lang="de-CH" dirty="0"/>
               <a:t>Unkomplizierte/schnelle Unterstützung bei schwierigen Klienten </a:t>
             </a:r>
-            <a:endParaRPr lang="de-CH" dirty="0" smtClean="0"/>
-          </a:p>
-          <a:p>
-            <a:r>
-              <a:rPr lang="de-CH" b="1" dirty="0" err="1" smtClean="0"/>
+          </a:p>
+          <a:p>
+            <a:r>
+              <a:rPr lang="de-CH" b="1" dirty="0" err="1"/>
               <a:t>Pain</a:t>
             </a:r>
             <a:r>
-              <a:rPr lang="de-CH" b="1" dirty="0" smtClean="0"/>
+              <a:rPr lang="de-CH" b="1" dirty="0"/>
               <a:t> </a:t>
             </a:r>
             <a:r>
@@ -5150,17 +5205,15 @@
               <a:rPr lang="de-CH" dirty="0"/>
               <a:t>Schnell überfordert bei brenzligen Situationen aufgrund mangelnder Ausbildung/Erfahrung, fehlende Informationen, Mühsam wertvolle Geräte mitschleppen </a:t>
             </a:r>
-            <a:endParaRPr lang="de-CH" dirty="0" smtClean="0"/>
-          </a:p>
-          <a:p>
-            <a:endParaRPr lang="de-CH" dirty="0" smtClean="0"/>
-          </a:p>
-          <a:p>
-            <a:r>
-              <a:rPr lang="de-CH" b="1" dirty="0" smtClean="0"/>
+          </a:p>
+          <a:p>
+            <a:endParaRPr lang="de-CH" dirty="0"/>
+          </a:p>
+          <a:p>
+            <a:r>
+              <a:rPr lang="de-CH" b="1" dirty="0"/>
               <a:t>Statements</a:t>
             </a:r>
-            <a:endParaRPr lang="de-CH" b="1" dirty="0"/>
           </a:p>
           <a:p>
             <a:pPr lvl="1"/>
@@ -5215,10 +5268,45 @@
               <a:rPr lang="de-CH" dirty="0"/>
               <a:t>nicht noch mehr Ausrüstung mittragen muss. </a:t>
             </a:r>
-            <a:endParaRPr lang="de-CH" dirty="0"/>
-          </a:p>
-        </p:txBody>
-      </p:sp>
+          </a:p>
+        </p:txBody>
+      </p:sp>
+      <p:pic>
+        <p:nvPicPr>
+          <p:cNvPr id="5" name="Grafik 4" descr="Ein Bild, das Person, Mann, haltend, jung enthält.&#10;&#10;Automatisch generierte Beschreibung">
+            <a:extLst>
+              <a:ext uri="{FF2B5EF4-FFF2-40B4-BE49-F238E27FC236}">
+                <a16:creationId xmlns:a16="http://schemas.microsoft.com/office/drawing/2014/main" id="{6679301E-4E90-43FF-803E-8D2799A7AB2A}"/>
+              </a:ext>
+            </a:extLst>
+          </p:cNvPr>
+          <p:cNvPicPr>
+            <a:picLocks noChangeAspect="1"/>
+          </p:cNvPicPr>
+          <p:nvPr/>
+        </p:nvPicPr>
+        <p:blipFill>
+          <a:blip r:embed="rId2">
+            <a:extLst>
+              <a:ext uri="{28A0092B-C50C-407E-A947-70E740481C1C}">
+                <a14:useLocalDpi xmlns:a14="http://schemas.microsoft.com/office/drawing/2010/main" val="0"/>
+              </a:ext>
+            </a:extLst>
+          </a:blip>
+          <a:stretch>
+            <a:fillRect/>
+          </a:stretch>
+        </p:blipFill>
+        <p:spPr>
+          <a:xfrm>
+            <a:off x="10366216" y="702156"/>
+            <a:ext cx="1013800" cy="1013800"/>
+          </a:xfrm>
+          <a:prstGeom prst="rect">
+            <a:avLst/>
+          </a:prstGeom>
+        </p:spPr>
+      </p:pic>
     </p:spTree>
     <p:extLst>
       <p:ext uri="{BB962C8B-B14F-4D97-AF65-F5344CB8AC3E}">
@@ -5229,13 +5317,6 @@
   <p:clrMapOvr>
     <a:masterClrMapping/>
   </p:clrMapOvr>
-  <p:timing>
-    <p:tnLst>
-      <p:par>
-        <p:cTn id="1" dur="indefinite" restart="never" nodeType="tmRoot"/>
-      </p:par>
-    </p:tnLst>
-  </p:timing>
 </p:sld>
 </file>
 
@@ -5272,10 +5353,9 @@
           <a:lstStyle/>
           <a:p>
             <a:r>
-              <a:rPr lang="de-CH" dirty="0" smtClean="0"/>
+              <a:rPr lang="de-CH" dirty="0"/>
               <a:t>Design / Storyboards – Story #1</a:t>
             </a:r>
-            <a:endParaRPr lang="de-CH" dirty="0"/>
           </a:p>
         </p:txBody>
       </p:sp>
@@ -5318,13 +5398,6 @@
   <p:clrMapOvr>
     <a:masterClrMapping/>
   </p:clrMapOvr>
-  <p:timing>
-    <p:tnLst>
-      <p:par>
-        <p:cTn id="1" dur="indefinite" restart="never" nodeType="tmRoot"/>
-      </p:par>
-    </p:tnLst>
-  </p:timing>
 </p:sld>
 </file>
 
@@ -5362,13 +5435,8 @@
           <a:p>
             <a:r>
               <a:rPr lang="de-CH" dirty="0"/>
-              <a:t>Design / Storyboards – Story </a:t>
-            </a:r>
-            <a:r>
-              <a:rPr lang="de-CH" dirty="0" smtClean="0"/>
-              <a:t>#2</a:t>
-            </a:r>
-            <a:endParaRPr lang="de-CH" dirty="0"/>
+              <a:t>Design / Storyboards – Story #2</a:t>
+            </a:r>
           </a:p>
         </p:txBody>
       </p:sp>
@@ -5411,13 +5479,6 @@
   <p:clrMapOvr>
     <a:masterClrMapping/>
   </p:clrMapOvr>
-  <p:timing>
-    <p:tnLst>
-      <p:par>
-        <p:cTn id="1" dur="indefinite" restart="never" nodeType="tmRoot"/>
-      </p:par>
-    </p:tnLst>
-  </p:timing>
 </p:sld>
 </file>
 
@@ -5455,13 +5516,8 @@
           <a:p>
             <a:r>
               <a:rPr lang="de-CH" dirty="0"/>
-              <a:t>Design / Storyboards – Story </a:t>
-            </a:r>
-            <a:r>
-              <a:rPr lang="de-CH" dirty="0" smtClean="0"/>
-              <a:t>#3</a:t>
-            </a:r>
-            <a:endParaRPr lang="de-CH" dirty="0"/>
+              <a:t>Design / Storyboards – Story #3</a:t>
+            </a:r>
           </a:p>
         </p:txBody>
       </p:sp>
@@ -5504,13 +5560,6 @@
   <p:clrMapOvr>
     <a:masterClrMapping/>
   </p:clrMapOvr>
-  <p:timing>
-    <p:tnLst>
-      <p:par>
-        <p:cTn id="1" dur="indefinite" restart="never" nodeType="tmRoot"/>
-      </p:par>
-    </p:tnLst>
-  </p:timing>
 </p:sld>
 </file>
 
@@ -5547,14 +5596,13 @@
           <a:lstStyle/>
           <a:p>
             <a:r>
-              <a:rPr lang="de-CH" dirty="0" err="1" smtClean="0"/>
+              <a:rPr lang="de-CH" dirty="0" err="1"/>
               <a:t>Prototypes</a:t>
             </a:r>
             <a:r>
-              <a:rPr lang="de-CH" dirty="0" smtClean="0"/>
+              <a:rPr lang="de-CH" dirty="0"/>
               <a:t> #1</a:t>
             </a:r>
-            <a:endParaRPr lang="de-CH" dirty="0"/>
           </a:p>
         </p:txBody>
       </p:sp>
@@ -5627,13 +5675,6 @@
   <p:clrMapOvr>
     <a:masterClrMapping/>
   </p:clrMapOvr>
-  <p:timing>
-    <p:tnLst>
-      <p:par>
-        <p:cTn id="1" dur="indefinite" restart="never" nodeType="tmRoot"/>
-      </p:par>
-    </p:tnLst>
-  </p:timing>
 </p:sld>
 </file>
 
@@ -5675,13 +5716,8 @@
             </a:r>
             <a:r>
               <a:rPr lang="de-CH" dirty="0"/>
-              <a:t> </a:t>
-            </a:r>
-            <a:r>
-              <a:rPr lang="de-CH" dirty="0" smtClean="0"/>
-              <a:t>#2</a:t>
-            </a:r>
-            <a:endParaRPr lang="de-CH" dirty="0"/>
+              <a:t> #2</a:t>
+            </a:r>
           </a:p>
         </p:txBody>
       </p:sp>
@@ -5753,13 +5789,6 @@
   <p:clrMapOvr>
     <a:masterClrMapping/>
   </p:clrMapOvr>
-  <p:timing>
-    <p:tnLst>
-      <p:par>
-        <p:cTn id="1" dur="indefinite" restart="never" nodeType="tmRoot"/>
-      </p:par>
-    </p:tnLst>
-  </p:timing>
 </p:sld>
 </file>
 
@@ -5801,13 +5830,8 @@
             </a:r>
             <a:r>
               <a:rPr lang="de-CH" dirty="0"/>
-              <a:t> </a:t>
-            </a:r>
-            <a:r>
-              <a:rPr lang="de-CH" dirty="0" smtClean="0"/>
-              <a:t>#3</a:t>
-            </a:r>
-            <a:endParaRPr lang="de-CH" dirty="0"/>
+              <a:t> #3</a:t>
+            </a:r>
           </a:p>
         </p:txBody>
       </p:sp>
@@ -5847,13 +5871,6 @@
   <p:clrMapOvr>
     <a:masterClrMapping/>
   </p:clrMapOvr>
-  <p:timing>
-    <p:tnLst>
-      <p:par>
-        <p:cTn id="1" dur="indefinite" restart="never" nodeType="tmRoot"/>
-      </p:par>
-    </p:tnLst>
-  </p:timing>
 </p:sld>
 </file>
 
@@ -5890,14 +5907,13 @@
           <a:lstStyle/>
           <a:p>
             <a:r>
-              <a:rPr lang="de-CH" dirty="0" err="1" smtClean="0"/>
+              <a:rPr lang="de-CH" dirty="0" err="1"/>
               <a:t>Conclusion</a:t>
             </a:r>
             <a:r>
-              <a:rPr lang="de-CH" dirty="0" smtClean="0"/>
+              <a:rPr lang="de-CH" dirty="0"/>
               <a:t> Iteration #1</a:t>
             </a:r>
-            <a:endParaRPr lang="de-CH" dirty="0"/>
           </a:p>
         </p:txBody>
       </p:sp>
@@ -5932,82 +5948,54 @@
           <a:p>
             <a:pPr lvl="1"/>
             <a:r>
-              <a:rPr lang="de-CH" dirty="0" err="1" smtClean="0"/>
+              <a:rPr lang="de-CH" dirty="0" err="1"/>
               <a:t>Responsive</a:t>
             </a:r>
             <a:r>
-              <a:rPr lang="de-CH" dirty="0" smtClean="0"/>
-              <a:t> </a:t>
-            </a:r>
-            <a:r>
-              <a:rPr lang="de-CH" dirty="0"/>
-              <a:t>Design </a:t>
+              <a:rPr lang="de-CH" dirty="0"/>
+              <a:t> Design </a:t>
             </a:r>
           </a:p>
           <a:p>
             <a:pPr lvl="1"/>
             <a:r>
-              <a:rPr lang="de-CH" dirty="0" smtClean="0"/>
-              <a:t>Visuelle </a:t>
-            </a:r>
-            <a:r>
-              <a:rPr lang="de-CH" dirty="0"/>
-              <a:t>Abbildung von Klienten und Pfleger erwünscht </a:t>
+              <a:rPr lang="de-CH" dirty="0"/>
+              <a:t>Visuelle Abbildung von Klienten und Pfleger erwünscht </a:t>
             </a:r>
           </a:p>
           <a:p>
             <a:pPr lvl="1"/>
             <a:r>
-              <a:rPr lang="de-CH" dirty="0" smtClean="0"/>
-              <a:t>Hilfefunktion </a:t>
-            </a:r>
-            <a:r>
-              <a:rPr lang="de-CH" dirty="0"/>
-              <a:t>für Unterstützung in Notfällen wird benötigt </a:t>
+              <a:rPr lang="de-CH" dirty="0"/>
+              <a:t>Hilfefunktion für Unterstützung in Notfällen wird benötigt </a:t>
             </a:r>
           </a:p>
           <a:p>
             <a:pPr lvl="1"/>
             <a:r>
-              <a:rPr lang="de-CH" dirty="0" smtClean="0"/>
-              <a:t>Möglichkeit </a:t>
-            </a:r>
-            <a:r>
-              <a:rPr lang="de-CH" dirty="0"/>
-              <a:t>laufend Aufgaben direkt zu Rapportieren und aber auch erst im Nachhinein </a:t>
+              <a:rPr lang="de-CH" dirty="0"/>
+              <a:t>Möglichkeit laufend Aufgaben direkt zu Rapportieren und aber auch erst im Nachhinein </a:t>
             </a:r>
           </a:p>
           <a:p>
             <a:pPr lvl="1"/>
             <a:r>
-              <a:rPr lang="de-CH" dirty="0" smtClean="0"/>
-              <a:t>Einheitliche </a:t>
-            </a:r>
-            <a:r>
-              <a:rPr lang="de-CH" dirty="0"/>
-              <a:t>Dateiformate &amp; Strukturierte Daten (Keine Bilder, Audiofiles) </a:t>
+              <a:rPr lang="de-CH" dirty="0"/>
+              <a:t>Einheitliche Dateiformate &amp; Strukturierte Daten (Keine Bilder, Audiofiles) </a:t>
             </a:r>
           </a:p>
           <a:p>
             <a:pPr lvl="1"/>
             <a:r>
-              <a:rPr lang="de-CH" dirty="0" smtClean="0"/>
-              <a:t>Übersichtliche </a:t>
-            </a:r>
-            <a:r>
-              <a:rPr lang="de-CH" dirty="0"/>
-              <a:t>Historie mit geeigneter Suchfunktion (Tags o.ä.) </a:t>
+              <a:rPr lang="de-CH" dirty="0"/>
+              <a:t>Übersichtliche Historie mit geeigneter Suchfunktion (Tags o.ä.) </a:t>
             </a:r>
           </a:p>
           <a:p>
             <a:pPr lvl="1"/>
             <a:r>
-              <a:rPr lang="de-CH" dirty="0" smtClean="0"/>
-              <a:t>Prozess </a:t>
-            </a:r>
-            <a:r>
-              <a:rPr lang="de-CH" dirty="0"/>
-              <a:t>Leistungen -&gt; Aufgaben -&gt; Protokolle benötigt genaueres </a:t>
+              <a:rPr lang="de-CH" dirty="0"/>
+              <a:t>Prozess Leistungen -&gt; Aufgaben -&gt; Protokolle benötigt genaueres </a:t>
             </a:r>
             <a:r>
               <a:rPr lang="de-CH" dirty="0" err="1"/>
@@ -6033,13 +6021,6 @@
   <p:clrMapOvr>
     <a:masterClrMapping/>
   </p:clrMapOvr>
-  <p:timing>
-    <p:tnLst>
-      <p:par>
-        <p:cTn id="1" dur="indefinite" restart="never" nodeType="tmRoot"/>
-      </p:par>
-    </p:tnLst>
-  </p:timing>
 </p:sld>
 </file>
 
@@ -6085,90 +6066,72 @@
             </a:r>
             <a:r>
               <a:rPr lang="de-CH" dirty="0"/>
-              <a:t> – Iteration </a:t>
-            </a:r>
-            <a:r>
-              <a:rPr lang="de-CH" dirty="0" smtClean="0"/>
-              <a:t>#2</a:t>
+              <a:t> – Iteration #2</a:t>
+            </a:r>
+          </a:p>
+        </p:txBody>
+      </p:sp>
+      <p:sp>
+        <p:nvSpPr>
+          <p:cNvPr id="3" name="Inhaltsplatzhalter 2"/>
+          <p:cNvSpPr>
+            <a:spLocks noGrp="1"/>
+          </p:cNvSpPr>
+          <p:nvPr>
+            <p:ph idx="1"/>
+          </p:nvPr>
+        </p:nvSpPr>
+        <p:spPr/>
+        <p:txBody>
+          <a:bodyPr/>
+          <a:lstStyle/>
+          <a:p>
+            <a:r>
+              <a:rPr lang="de-CH" b="1" dirty="0"/>
+              <a:t>Focus:</a:t>
             </a:r>
             <a:endParaRPr lang="de-CH" dirty="0"/>
           </a:p>
-        </p:txBody>
-      </p:sp>
-      <p:sp>
-        <p:nvSpPr>
-          <p:cNvPr id="3" name="Inhaltsplatzhalter 2"/>
-          <p:cNvSpPr>
-            <a:spLocks noGrp="1"/>
-          </p:cNvSpPr>
-          <p:nvPr>
-            <p:ph idx="1"/>
-          </p:nvPr>
-        </p:nvSpPr>
-        <p:spPr/>
-        <p:txBody>
-          <a:bodyPr/>
-          <a:lstStyle/>
-          <a:p>
-            <a:r>
-              <a:rPr lang="de-CH" b="1" dirty="0" smtClean="0"/>
-              <a:t>Focus:</a:t>
-            </a:r>
+          <a:p>
+            <a:pPr lvl="1"/>
+            <a:r>
+              <a:rPr lang="de-CH" dirty="0"/>
+              <a:t>Wir wollen eine Hilfefunktion (Form, Implementation offen) </a:t>
+            </a:r>
+          </a:p>
+          <a:p>
+            <a:pPr lvl="1"/>
+            <a:r>
+              <a:rPr lang="de-CH" dirty="0"/>
+              <a:t>Das Protokoll soll laufend oder im Nachhinein erfasst werden können. </a:t>
+            </a:r>
+          </a:p>
+          <a:p>
+            <a:pPr lvl="1"/>
+            <a:r>
+              <a:rPr lang="de-CH" dirty="0"/>
+              <a:t>Historie (Filtern Suchen Kalender) </a:t>
+            </a:r>
+          </a:p>
+          <a:p>
+            <a:pPr lvl="1"/>
             <a:endParaRPr lang="de-CH" dirty="0"/>
           </a:p>
           <a:p>
-            <a:pPr lvl="1"/>
-            <a:r>
-              <a:rPr lang="de-CH" dirty="0" smtClean="0"/>
-              <a:t>Wir </a:t>
-            </a:r>
-            <a:r>
-              <a:rPr lang="de-CH" dirty="0"/>
-              <a:t>wollen eine Hilfefunktion (Form, Implementation offen) </a:t>
-            </a:r>
-          </a:p>
-          <a:p>
-            <a:pPr lvl="1"/>
-            <a:r>
-              <a:rPr lang="de-CH" dirty="0" smtClean="0"/>
-              <a:t>Das </a:t>
-            </a:r>
-            <a:r>
-              <a:rPr lang="de-CH" dirty="0"/>
-              <a:t>Protokoll soll laufend oder im Nachhinein erfasst werden können. </a:t>
-            </a:r>
-          </a:p>
-          <a:p>
-            <a:pPr lvl="1"/>
-            <a:r>
-              <a:rPr lang="de-CH" dirty="0" smtClean="0"/>
-              <a:t>Historie </a:t>
-            </a:r>
-            <a:r>
-              <a:rPr lang="de-CH" dirty="0"/>
-              <a:t>(Filtern Suchen Kalender) </a:t>
-            </a:r>
-            <a:endParaRPr lang="de-CH" dirty="0"/>
-          </a:p>
-          <a:p>
-            <a:pPr lvl="1"/>
-            <a:endParaRPr lang="de-CH" dirty="0" smtClean="0"/>
-          </a:p>
-          <a:p>
-            <a:r>
-              <a:rPr lang="de-CH" b="1" dirty="0" smtClean="0"/>
+            <a:r>
+              <a:rPr lang="de-CH" b="1" dirty="0"/>
               <a:t>Out </a:t>
             </a:r>
             <a:r>
-              <a:rPr lang="de-CH" b="1" dirty="0" err="1" smtClean="0"/>
+              <a:rPr lang="de-CH" b="1" dirty="0" err="1"/>
               <a:t>of</a:t>
             </a:r>
             <a:r>
-              <a:rPr lang="de-CH" b="1" dirty="0" smtClean="0"/>
+              <a:rPr lang="de-CH" b="1" dirty="0"/>
               <a:t> </a:t>
             </a:r>
             <a:r>
-              <a:rPr lang="de-CH" b="1" dirty="0" err="1" smtClean="0"/>
+              <a:rPr lang="de-CH" b="1" dirty="0" err="1"/>
               <a:t>scope</a:t>
             </a:r>
             <a:endParaRPr lang="de-CH" dirty="0"/>
@@ -6211,13 +6174,6 @@
   <p:clrMapOvr>
     <a:masterClrMapping/>
   </p:clrMapOvr>
-  <p:timing>
-    <p:tnLst>
-      <p:par>
-        <p:cTn id="1" dur="indefinite" restart="never" nodeType="tmRoot"/>
-      </p:par>
-    </p:tnLst>
-  </p:timing>
 </p:sld>
 </file>
 
@@ -6254,10 +6210,9 @@
           <a:lstStyle/>
           <a:p>
             <a:r>
-              <a:rPr lang="de-CH" dirty="0" smtClean="0"/>
+              <a:rPr lang="de-CH" dirty="0"/>
               <a:t>Research</a:t>
             </a:r>
-            <a:endParaRPr lang="de-CH" dirty="0"/>
           </a:p>
         </p:txBody>
       </p:sp>
@@ -6277,26 +6232,26 @@
           <a:lstStyle/>
           <a:p>
             <a:r>
-              <a:rPr lang="de-CH" b="1" dirty="0" smtClean="0"/>
+              <a:rPr lang="de-CH" b="1" dirty="0"/>
               <a:t>Interviews</a:t>
             </a:r>
           </a:p>
           <a:p>
             <a:pPr lvl="1"/>
             <a:r>
-              <a:rPr lang="de-CH" dirty="0" smtClean="0"/>
+              <a:rPr lang="de-CH" dirty="0"/>
               <a:t>follow </a:t>
             </a:r>
             <a:r>
-              <a:rPr lang="de-CH" dirty="0" err="1" smtClean="0"/>
+              <a:rPr lang="de-CH" dirty="0" err="1"/>
               <a:t>up</a:t>
             </a:r>
             <a:r>
-              <a:rPr lang="de-CH" dirty="0" smtClean="0"/>
+              <a:rPr lang="de-CH" dirty="0"/>
               <a:t> </a:t>
             </a:r>
             <a:r>
-              <a:rPr lang="de-CH" dirty="0" err="1" smtClean="0"/>
+              <a:rPr lang="de-CH" dirty="0" err="1"/>
               <a:t>questions</a:t>
             </a:r>
             <a:r>
@@ -6304,23 +6259,23 @@
               <a:t> </a:t>
             </a:r>
             <a:r>
-              <a:rPr lang="de-CH" dirty="0" err="1" smtClean="0"/>
+              <a:rPr lang="de-CH" dirty="0" err="1"/>
               <a:t>for</a:t>
             </a:r>
             <a:r>
-              <a:rPr lang="de-CH" dirty="0" smtClean="0"/>
+              <a:rPr lang="de-CH" dirty="0"/>
               <a:t> </a:t>
             </a:r>
             <a:r>
-              <a:rPr lang="de-CH" dirty="0" err="1" smtClean="0"/>
+              <a:rPr lang="de-CH" dirty="0" err="1"/>
               <a:t>new</a:t>
             </a:r>
             <a:r>
-              <a:rPr lang="de-CH" dirty="0" smtClean="0"/>
+              <a:rPr lang="de-CH" dirty="0"/>
               <a:t> </a:t>
             </a:r>
             <a:r>
-              <a:rPr lang="de-CH" dirty="0" err="1" smtClean="0"/>
+              <a:rPr lang="de-CH" dirty="0" err="1"/>
               <a:t>scope</a:t>
             </a:r>
             <a:endParaRPr lang="de-CH" dirty="0"/>
@@ -6337,13 +6292,6 @@
   <p:clrMapOvr>
     <a:masterClrMapping/>
   </p:clrMapOvr>
-  <p:timing>
-    <p:tnLst>
-      <p:par>
-        <p:cTn id="1" dur="indefinite" restart="never" nodeType="tmRoot"/>
-      </p:par>
-    </p:tnLst>
-  </p:timing>
 </p:sld>
 </file>
 
@@ -6380,10 +6328,9 @@
           <a:lstStyle/>
           <a:p>
             <a:r>
-              <a:rPr lang="de-CH" dirty="0" smtClean="0"/>
+              <a:rPr lang="de-CH" dirty="0"/>
               <a:t>Agenda</a:t>
             </a:r>
-            <a:endParaRPr lang="de-CH" dirty="0"/>
           </a:p>
         </p:txBody>
       </p:sp>
@@ -6405,70 +6352,70 @@
           <a:lstStyle/>
           <a:p>
             <a:r>
-              <a:rPr lang="de-CH" dirty="0" err="1" smtClean="0"/>
+              <a:rPr lang="de-CH" dirty="0" err="1"/>
               <a:t>Introduction</a:t>
             </a:r>
             <a:endParaRPr lang="de-CH" dirty="0"/>
           </a:p>
           <a:p>
             <a:r>
-              <a:rPr lang="de-CH" dirty="0" smtClean="0"/>
+              <a:rPr lang="de-CH" dirty="0"/>
               <a:t>Project </a:t>
             </a:r>
             <a:r>
-              <a:rPr lang="de-CH" dirty="0" err="1" smtClean="0"/>
+              <a:rPr lang="de-CH" dirty="0" err="1"/>
               <a:t>Scope</a:t>
             </a:r>
-            <a:endParaRPr lang="de-CH" dirty="0" smtClean="0"/>
-          </a:p>
-          <a:p>
-            <a:r>
-              <a:rPr lang="de-CH" dirty="0" smtClean="0"/>
+            <a:endParaRPr lang="de-CH" dirty="0"/>
+          </a:p>
+          <a:p>
+            <a:r>
+              <a:rPr lang="de-CH" dirty="0"/>
               <a:t>Iteration #1 / #2</a:t>
             </a:r>
           </a:p>
           <a:p>
             <a:pPr lvl="1"/>
             <a:r>
-              <a:rPr lang="de-CH" dirty="0" smtClean="0"/>
+              <a:rPr lang="de-CH" dirty="0"/>
               <a:t>Research / Interviews</a:t>
             </a:r>
           </a:p>
           <a:p>
             <a:pPr lvl="1"/>
             <a:r>
-              <a:rPr lang="de-CH" dirty="0" err="1" smtClean="0"/>
+              <a:rPr lang="de-CH" dirty="0" err="1"/>
               <a:t>Synthesize</a:t>
             </a:r>
             <a:r>
-              <a:rPr lang="de-CH" dirty="0" smtClean="0"/>
+              <a:rPr lang="de-CH" dirty="0"/>
               <a:t> / </a:t>
             </a:r>
             <a:r>
-              <a:rPr lang="de-CH" dirty="0" err="1" smtClean="0"/>
+              <a:rPr lang="de-CH" dirty="0" err="1"/>
               <a:t>Personae</a:t>
             </a:r>
-            <a:endParaRPr lang="de-CH" dirty="0" smtClean="0"/>
+            <a:endParaRPr lang="de-CH" dirty="0"/>
           </a:p>
           <a:p>
             <a:pPr lvl="1"/>
             <a:r>
-              <a:rPr lang="de-CH" dirty="0" smtClean="0"/>
+              <a:rPr lang="de-CH" dirty="0"/>
               <a:t>Design / Storyboards</a:t>
             </a:r>
           </a:p>
           <a:p>
             <a:pPr lvl="1"/>
             <a:r>
-              <a:rPr lang="de-CH" dirty="0" err="1" smtClean="0"/>
+              <a:rPr lang="de-CH" dirty="0" err="1"/>
               <a:t>Prototypes</a:t>
             </a:r>
-            <a:endParaRPr lang="de-CH" dirty="0" smtClean="0"/>
+            <a:endParaRPr lang="de-CH" dirty="0"/>
           </a:p>
           <a:p>
             <a:pPr lvl="1"/>
             <a:r>
-              <a:rPr lang="de-CH" dirty="0" err="1" smtClean="0"/>
+              <a:rPr lang="de-CH" dirty="0" err="1"/>
               <a:t>Conclusion</a:t>
             </a:r>
             <a:endParaRPr lang="de-CH" dirty="0"/>
@@ -6485,13 +6432,6 @@
   <p:clrMapOvr>
     <a:masterClrMapping/>
   </p:clrMapOvr>
-  <p:timing>
-    <p:tnLst>
-      <p:par>
-        <p:cTn id="1" dur="indefinite" restart="never" nodeType="tmRoot"/>
-      </p:par>
-    </p:tnLst>
-  </p:timing>
 </p:sld>
 </file>
 
@@ -6550,19 +6490,19 @@
           <a:lstStyle/>
           <a:p>
             <a:r>
-              <a:rPr lang="de-CH" b="1" dirty="0" smtClean="0"/>
+              <a:rPr lang="de-CH" b="1" dirty="0"/>
               <a:t>New </a:t>
             </a:r>
             <a:r>
-              <a:rPr lang="de-CH" b="1" dirty="0" err="1" smtClean="0"/>
+              <a:rPr lang="de-CH" b="1" dirty="0" err="1"/>
               <a:t>statements</a:t>
             </a:r>
-            <a:endParaRPr lang="de-CH" b="1" dirty="0" smtClean="0"/>
+            <a:endParaRPr lang="de-CH" b="1" dirty="0"/>
           </a:p>
           <a:p>
             <a:pPr lvl="1"/>
             <a:r>
-              <a:rPr lang="de-CH" b="1" dirty="0" smtClean="0"/>
+              <a:rPr lang="de-CH" b="1" dirty="0"/>
               <a:t>Als </a:t>
             </a:r>
             <a:r>
@@ -6585,7 +6525,6 @@
               <a:rPr lang="de-CH" dirty="0"/>
               <a:t>einfach in der Applikation zurechtzukommen. </a:t>
             </a:r>
-            <a:endParaRPr lang="de-CH" dirty="0"/>
           </a:p>
         </p:txBody>
       </p:sp>
@@ -6599,13 +6538,6 @@
   <p:clrMapOvr>
     <a:masterClrMapping/>
   </p:clrMapOvr>
-  <p:timing>
-    <p:tnLst>
-      <p:par>
-        <p:cTn id="1" dur="indefinite" restart="never" nodeType="tmRoot"/>
-      </p:par>
-    </p:tnLst>
-  </p:timing>
 </p:sld>
 </file>
 
@@ -6664,14 +6596,14 @@
           <a:lstStyle/>
           <a:p>
             <a:r>
-              <a:rPr lang="de-CH" b="1" dirty="0" smtClean="0"/>
+              <a:rPr lang="de-CH" b="1" dirty="0"/>
               <a:t>New </a:t>
             </a:r>
             <a:r>
-              <a:rPr lang="de-CH" b="1" dirty="0" err="1" smtClean="0"/>
+              <a:rPr lang="de-CH" b="1" dirty="0" err="1"/>
               <a:t>statements</a:t>
             </a:r>
-            <a:endParaRPr lang="de-CH" b="1" dirty="0" smtClean="0"/>
+            <a:endParaRPr lang="de-CH" b="1" dirty="0"/>
           </a:p>
           <a:p>
             <a:pPr lvl="1"/>
@@ -6753,7 +6685,6 @@
               <a:rPr lang="de-CH" dirty="0"/>
               <a:t>von meinem Erfahrungsschatz profitieren können. </a:t>
             </a:r>
-            <a:endParaRPr lang="de-CH" dirty="0"/>
           </a:p>
         </p:txBody>
       </p:sp>
@@ -6767,13 +6698,6 @@
   <p:clrMapOvr>
     <a:masterClrMapping/>
   </p:clrMapOvr>
-  <p:timing>
-    <p:tnLst>
-      <p:par>
-        <p:cTn id="1" dur="indefinite" restart="never" nodeType="tmRoot"/>
-      </p:par>
-    </p:tnLst>
-  </p:timing>
 </p:sld>
 </file>
 
@@ -6832,19 +6756,19 @@
           <a:lstStyle/>
           <a:p>
             <a:r>
-              <a:rPr lang="de-CH" b="1" dirty="0" smtClean="0"/>
+              <a:rPr lang="de-CH" b="1" dirty="0"/>
               <a:t>New </a:t>
             </a:r>
             <a:r>
-              <a:rPr lang="de-CH" b="1" dirty="0" err="1" smtClean="0"/>
+              <a:rPr lang="de-CH" b="1" dirty="0" err="1"/>
               <a:t>statements</a:t>
             </a:r>
-            <a:endParaRPr lang="de-CH" b="1" dirty="0" smtClean="0"/>
+            <a:endParaRPr lang="de-CH" b="1" dirty="0"/>
           </a:p>
           <a:p>
             <a:pPr lvl="1"/>
             <a:r>
-              <a:rPr lang="de-CH" b="1" dirty="0" smtClean="0"/>
+              <a:rPr lang="de-CH" b="1" dirty="0"/>
               <a:t>Als </a:t>
             </a:r>
             <a:r>
@@ -6883,12 +6807,8 @@
               <a:t>möchte ich </a:t>
             </a:r>
             <a:r>
-              <a:rPr lang="de-CH" dirty="0" smtClean="0"/>
-              <a:t>möglichst </a:t>
-            </a:r>
-            <a:r>
-              <a:rPr lang="de-CH" dirty="0"/>
-              <a:t>keinen Text schreiben müssen, </a:t>
+              <a:rPr lang="de-CH" dirty="0"/>
+              <a:t>möglichst keinen Text schreiben müssen, </a:t>
             </a:r>
             <a:r>
               <a:rPr lang="de-CH" b="1" dirty="0"/>
@@ -6952,7 +6872,6 @@
               <a:rPr lang="de-CH" dirty="0"/>
               <a:t>immer weiss wo ich hin muss und wenn dass ich allenfalls kontaktieren muss. </a:t>
             </a:r>
-            <a:endParaRPr lang="de-CH" dirty="0"/>
           </a:p>
         </p:txBody>
       </p:sp>
@@ -6966,13 +6885,6 @@
   <p:clrMapOvr>
     <a:masterClrMapping/>
   </p:clrMapOvr>
-  <p:timing>
-    <p:tnLst>
-      <p:par>
-        <p:cTn id="1" dur="indefinite" restart="never" nodeType="tmRoot"/>
-      </p:par>
-    </p:tnLst>
-  </p:timing>
 </p:sld>
 </file>
 
@@ -7009,10 +6921,9 @@
           <a:lstStyle/>
           <a:p>
             <a:r>
-              <a:rPr lang="de-CH" dirty="0" smtClean="0"/>
+              <a:rPr lang="de-CH" dirty="0"/>
               <a:t>Prototype</a:t>
             </a:r>
-            <a:endParaRPr lang="de-CH" dirty="0"/>
           </a:p>
         </p:txBody>
       </p:sp>
@@ -7035,15 +6946,9 @@
               <a:rPr lang="de-CH" dirty="0">
                 <a:hlinkClick r:id="rId2"/>
               </a:rPr>
-              <a:t>https://xd.adobe.com/view/3093742d-d4d6-4620-7d95-7cb4aae7925c-46a2/?</a:t>
-            </a:r>
-            <a:r>
-              <a:rPr lang="de-CH" dirty="0" smtClean="0">
-                <a:hlinkClick r:id="rId2"/>
-              </a:rPr>
-              <a:t>fullscreen</a:t>
-            </a:r>
-            <a:endParaRPr lang="de-CH" dirty="0" smtClean="0"/>
+              <a:t>https://xd.adobe.com/view/3093742d-d4d6-4620-7d95-7cb4aae7925c-46a2/?fullscreen</a:t>
+            </a:r>
+            <a:endParaRPr lang="de-CH" dirty="0"/>
           </a:p>
         </p:txBody>
       </p:sp>
@@ -7057,13 +6962,6 @@
   <p:clrMapOvr>
     <a:masterClrMapping/>
   </p:clrMapOvr>
-  <p:timing>
-    <p:tnLst>
-      <p:par>
-        <p:cTn id="1" dur="indefinite" restart="never" nodeType="tmRoot"/>
-      </p:par>
-    </p:tnLst>
-  </p:timing>
 </p:sld>
 </file>
 
@@ -7086,6 +6984,115 @@
       </p:grpSpPr>
       <p:sp>
         <p:nvSpPr>
+          <p:cNvPr id="2" name="Titel 1">
+            <a:extLst>
+              <a:ext uri="{FF2B5EF4-FFF2-40B4-BE49-F238E27FC236}">
+                <a16:creationId xmlns:a16="http://schemas.microsoft.com/office/drawing/2014/main" id="{C9E7B3B0-DF77-4CDA-9F83-13FEA3B3AF15}"/>
+              </a:ext>
+            </a:extLst>
+          </p:cNvPr>
+          <p:cNvSpPr>
+            <a:spLocks noGrp="1"/>
+          </p:cNvSpPr>
+          <p:nvPr>
+            <p:ph type="title"/>
+          </p:nvPr>
+        </p:nvSpPr>
+        <p:spPr/>
+        <p:txBody>
+          <a:bodyPr/>
+          <a:lstStyle/>
+          <a:p>
+            <a:r>
+              <a:rPr lang="de-CH" dirty="0" err="1"/>
+              <a:t>Lessons</a:t>
+            </a:r>
+            <a:r>
+              <a:rPr lang="de-CH" dirty="0"/>
+              <a:t> </a:t>
+            </a:r>
+            <a:r>
+              <a:rPr lang="de-CH" dirty="0" err="1"/>
+              <a:t>LEarned</a:t>
+            </a:r>
+            <a:endParaRPr lang="de-DE" dirty="0"/>
+          </a:p>
+        </p:txBody>
+      </p:sp>
+      <p:sp>
+        <p:nvSpPr>
+          <p:cNvPr id="3" name="Inhaltsplatzhalter 2">
+            <a:extLst>
+              <a:ext uri="{FF2B5EF4-FFF2-40B4-BE49-F238E27FC236}">
+                <a16:creationId xmlns:a16="http://schemas.microsoft.com/office/drawing/2014/main" id="{D634C7BB-DBEA-4BCB-829A-015A7CF49E65}"/>
+              </a:ext>
+            </a:extLst>
+          </p:cNvPr>
+          <p:cNvSpPr>
+            <a:spLocks noGrp="1"/>
+          </p:cNvSpPr>
+          <p:nvPr>
+            <p:ph idx="1"/>
+          </p:nvPr>
+        </p:nvSpPr>
+        <p:spPr/>
+        <p:txBody>
+          <a:bodyPr/>
+          <a:lstStyle/>
+          <a:p>
+            <a:r>
+              <a:rPr lang="de-CH" dirty="0"/>
+              <a:t>Gute Arbeitsaufteilung</a:t>
+            </a:r>
+          </a:p>
+          <a:p>
+            <a:r>
+              <a:rPr lang="de-CH" dirty="0"/>
+              <a:t>Verschiedene Aspekte beleuchtet</a:t>
+            </a:r>
+            <a:endParaRPr lang="de-DE" dirty="0"/>
+          </a:p>
+          <a:p>
+            <a:r>
+              <a:rPr lang="de-DE" dirty="0"/>
+              <a:t>Resultate in relativ geringer Zeit</a:t>
+            </a:r>
+            <a:endParaRPr lang="de-CH" dirty="0"/>
+          </a:p>
+        </p:txBody>
+      </p:sp>
+    </p:spTree>
+    <p:extLst>
+      <p:ext uri="{BB962C8B-B14F-4D97-AF65-F5344CB8AC3E}">
+        <p14:creationId xmlns:p14="http://schemas.microsoft.com/office/powerpoint/2010/main" val="2304758417"/>
+      </p:ext>
+    </p:extLst>
+  </p:cSld>
+  <p:clrMapOvr>
+    <a:masterClrMapping/>
+  </p:clrMapOvr>
+</p:sld>
+</file>
+
+<file path=ppt/slides/slide25.xml><?xml version="1.0" encoding="utf-8"?>
+<p:sld xmlns:a="http://schemas.openxmlformats.org/drawingml/2006/main" xmlns:r="http://schemas.openxmlformats.org/officeDocument/2006/relationships" xmlns:p="http://schemas.openxmlformats.org/presentationml/2006/main">
+  <p:cSld>
+    <p:spTree>
+      <p:nvGrpSpPr>
+        <p:cNvPr id="1" name=""/>
+        <p:cNvGrpSpPr/>
+        <p:nvPr/>
+      </p:nvGrpSpPr>
+      <p:grpSpPr>
+        <a:xfrm>
+          <a:off x="0" y="0"/>
+          <a:ext cx="0" cy="0"/>
+          <a:chOff x="0" y="0"/>
+          <a:chExt cx="0" cy="0"/>
+        </a:xfrm>
+      </p:grpSpPr>
+      <p:sp>
+        <p:nvSpPr>
           <p:cNvPr id="2" name="Titel 1"/>
           <p:cNvSpPr>
             <a:spLocks noGrp="1"/>
@@ -7100,10 +7107,9 @@
           <a:lstStyle/>
           <a:p>
             <a:r>
-              <a:rPr lang="de-CH" dirty="0" smtClean="0"/>
+              <a:rPr lang="de-CH" dirty="0"/>
               <a:t>Fragen?</a:t>
             </a:r>
-            <a:endParaRPr lang="de-CH" dirty="0"/>
           </a:p>
         </p:txBody>
       </p:sp>
@@ -7136,13 +7142,6 @@
   <p:clrMapOvr>
     <a:masterClrMapping/>
   </p:clrMapOvr>
-  <p:timing>
-    <p:tnLst>
-      <p:par>
-        <p:cTn id="1" dur="indefinite" restart="never" nodeType="tmRoot"/>
-      </p:par>
-    </p:tnLst>
-  </p:timing>
 </p:sld>
 </file>
 
@@ -7179,7 +7178,7 @@
           <a:lstStyle/>
           <a:p>
             <a:r>
-              <a:rPr lang="de-CH" dirty="0" err="1" smtClean="0"/>
+              <a:rPr lang="de-CH" dirty="0" err="1"/>
               <a:t>Introduction</a:t>
             </a:r>
             <a:endParaRPr lang="de-CH" dirty="0"/>
@@ -7202,82 +7201,64 @@
           <a:lstStyle/>
           <a:p>
             <a:r>
-              <a:rPr lang="de-CH" b="1" dirty="0" smtClean="0"/>
+              <a:rPr lang="de-CH" b="1" dirty="0"/>
               <a:t>Team Members:</a:t>
             </a:r>
-            <a:endParaRPr lang="de-CH" b="1" dirty="0"/>
           </a:p>
           <a:p>
             <a:pPr lvl="1"/>
             <a:r>
-              <a:rPr lang="de-CH" dirty="0" err="1" smtClean="0"/>
+              <a:rPr lang="de-CH" dirty="0" err="1"/>
               <a:t>Amalathas</a:t>
             </a:r>
             <a:r>
               <a:rPr lang="de-CH" dirty="0"/>
-              <a:t>, </a:t>
-            </a:r>
-            <a:r>
-              <a:rPr lang="de-CH" dirty="0" smtClean="0"/>
-              <a:t>Kevin</a:t>
+              <a:t>, Kevin</a:t>
             </a:r>
           </a:p>
           <a:p>
             <a:pPr lvl="1"/>
             <a:r>
-              <a:rPr lang="de-CH" dirty="0" smtClean="0"/>
+              <a:rPr lang="de-CH" dirty="0"/>
               <a:t>Biasutti, Yannis</a:t>
             </a:r>
           </a:p>
           <a:p>
             <a:pPr lvl="1"/>
             <a:r>
-              <a:rPr lang="de-CH" dirty="0" err="1" smtClean="0"/>
+              <a:rPr lang="de-CH" dirty="0" err="1"/>
               <a:t>Joder</a:t>
             </a:r>
             <a:r>
               <a:rPr lang="de-CH" dirty="0"/>
-              <a:t>, </a:t>
-            </a:r>
-            <a:r>
-              <a:rPr lang="de-CH" dirty="0" smtClean="0"/>
-              <a:t>Markus</a:t>
+              <a:t>, Markus</a:t>
             </a:r>
           </a:p>
           <a:p>
             <a:pPr lvl="1"/>
             <a:r>
-              <a:rPr lang="de-CH" dirty="0" err="1" smtClean="0"/>
+              <a:rPr lang="de-CH" dirty="0" err="1"/>
               <a:t>Moeri</a:t>
             </a:r>
             <a:r>
               <a:rPr lang="de-CH" dirty="0"/>
-              <a:t>, Alexandre </a:t>
-            </a:r>
-            <a:r>
-              <a:rPr lang="de-CH" dirty="0" smtClean="0"/>
-              <a:t>Reinhard</a:t>
-            </a:r>
+              <a:t>, Alexandre Reinhard</a:t>
+            </a:r>
+          </a:p>
+          <a:p>
+            <a:pPr lvl="1"/>
+            <a:r>
+              <a:rPr lang="de-CH" dirty="0" err="1"/>
+              <a:t>Rindlisbacher</a:t>
+            </a:r>
+            <a:r>
+              <a:rPr lang="de-CH" dirty="0"/>
+              <a:t>, José Miguel</a:t>
+            </a:r>
+          </a:p>
+          <a:p>
+            <a:pPr lvl="1"/>
             <a:endParaRPr lang="de-CH" dirty="0"/>
-          </a:p>
-          <a:p>
-            <a:pPr lvl="1"/>
-            <a:r>
-              <a:rPr lang="de-CH" dirty="0" err="1" smtClean="0"/>
-              <a:t>Rindlisbacher</a:t>
-            </a:r>
-            <a:r>
-              <a:rPr lang="de-CH" dirty="0"/>
-              <a:t>, José </a:t>
-            </a:r>
-            <a:r>
-              <a:rPr lang="de-CH" dirty="0" smtClean="0"/>
-              <a:t>Miguel</a:t>
-            </a:r>
-          </a:p>
-          <a:p>
-            <a:pPr lvl="1"/>
-            <a:endParaRPr lang="de-CH" dirty="0" smtClean="0"/>
           </a:p>
           <a:p>
             <a:pPr>
@@ -7286,28 +7267,20 @@
               </a:tabLst>
             </a:pPr>
             <a:r>
-              <a:rPr lang="de-CH" b="1" dirty="0" smtClean="0"/>
+              <a:rPr lang="de-CH" b="1" dirty="0"/>
               <a:t>User </a:t>
             </a:r>
             <a:r>
-              <a:rPr lang="de-CH" b="1" dirty="0" err="1" smtClean="0"/>
+              <a:rPr lang="de-CH" b="1" dirty="0" err="1"/>
               <a:t>group</a:t>
             </a:r>
             <a:r>
-              <a:rPr lang="de-CH" b="1" dirty="0" smtClean="0"/>
+              <a:rPr lang="de-CH" b="1" dirty="0"/>
               <a:t>: 	</a:t>
             </a:r>
             <a:r>
-              <a:rPr lang="en-US" dirty="0" smtClean="0"/>
-              <a:t>health </a:t>
-            </a:r>
-            <a:r>
               <a:rPr lang="en-US" dirty="0"/>
-              <a:t>visitor for ambulant </a:t>
-            </a:r>
-            <a:r>
-              <a:rPr lang="en-US" dirty="0" smtClean="0"/>
-              <a:t>patients</a:t>
+              <a:t>health visitor for ambulant patients</a:t>
             </a:r>
           </a:p>
           <a:p>
@@ -7318,30 +7291,18 @@
             </a:pPr>
             <a:r>
               <a:rPr lang="en-US" b="1" dirty="0"/>
-              <a:t>D</a:t>
-            </a:r>
-            <a:r>
-              <a:rPr lang="en-US" b="1" dirty="0" smtClean="0"/>
-              <a:t>isease</a:t>
-            </a:r>
-            <a:r>
-              <a:rPr lang="en-US" b="1" dirty="0"/>
-              <a:t>:</a:t>
+              <a:t>Disease:</a:t>
             </a:r>
             <a:r>
               <a:rPr lang="en-US" dirty="0"/>
-              <a:t> </a:t>
-            </a:r>
-            <a:r>
-              <a:rPr lang="en-US" dirty="0" smtClean="0"/>
-              <a:t>	</a:t>
-            </a:r>
-            <a:r>
-              <a:rPr lang="en-US" dirty="0" err="1" smtClean="0"/>
+              <a:t> 	</a:t>
+            </a:r>
+            <a:r>
+              <a:rPr lang="en-US" dirty="0" err="1"/>
               <a:t>addication</a:t>
             </a:r>
             <a:r>
-              <a:rPr lang="en-US" dirty="0" smtClean="0"/>
+              <a:rPr lang="en-US" dirty="0"/>
               <a:t> 	depression</a:t>
             </a:r>
           </a:p>
@@ -7393,13 +7354,6 @@
   <p:clrMapOvr>
     <a:masterClrMapping/>
   </p:clrMapOvr>
-  <p:timing>
-    <p:tnLst>
-      <p:par>
-        <p:cTn id="1" dur="indefinite" restart="never" nodeType="tmRoot"/>
-      </p:par>
-    </p:tnLst>
-  </p:timing>
 </p:sld>
 </file>
 
@@ -7436,11 +7390,11 @@
           <a:lstStyle/>
           <a:p>
             <a:r>
-              <a:rPr lang="de-CH" dirty="0" smtClean="0"/>
+              <a:rPr lang="de-CH" dirty="0"/>
               <a:t>Project </a:t>
             </a:r>
             <a:r>
-              <a:rPr lang="de-CH" dirty="0" err="1" smtClean="0"/>
+              <a:rPr lang="de-CH" dirty="0" err="1"/>
               <a:t>Scope</a:t>
             </a:r>
             <a:endParaRPr lang="de-CH" dirty="0"/>
@@ -7470,31 +7424,19 @@
           <a:p>
             <a:r>
               <a:rPr lang="de-CH" b="1" dirty="0"/>
-              <a:t>P</a:t>
-            </a:r>
-            <a:r>
-              <a:rPr lang="de-CH" b="1" dirty="0" smtClean="0"/>
-              <a:t>roject </a:t>
-            </a:r>
-            <a:r>
-              <a:rPr lang="de-CH" b="1" dirty="0" err="1" smtClean="0"/>
+              <a:t>Project </a:t>
+            </a:r>
+            <a:r>
+              <a:rPr lang="de-CH" b="1" dirty="0" err="1"/>
               <a:t>restrictions</a:t>
             </a:r>
-            <a:endParaRPr lang="de-CH" b="1" dirty="0" smtClean="0"/>
+            <a:endParaRPr lang="de-CH" b="1" dirty="0"/>
           </a:p>
           <a:p>
             <a:pPr lvl="1"/>
             <a:r>
-              <a:rPr lang="en-US" dirty="0" smtClean="0"/>
-              <a:t>MS </a:t>
-            </a:r>
-            <a:r>
               <a:rPr lang="en-US" dirty="0"/>
-              <a:t>Teams for online meetings and live editing of </a:t>
-            </a:r>
-            <a:r>
-              <a:rPr lang="en-US" dirty="0" smtClean="0"/>
-              <a:t>files</a:t>
+              <a:t>MS Teams for online meetings and live editing of files</a:t>
             </a:r>
           </a:p>
           <a:p>
@@ -7516,23 +7458,23 @@
               <a:t> final </a:t>
             </a:r>
             <a:r>
-              <a:rPr lang="de-CH" dirty="0" err="1" smtClean="0"/>
+              <a:rPr lang="de-CH" dirty="0" err="1"/>
               <a:t>artifacts</a:t>
             </a:r>
-            <a:endParaRPr lang="de-CH" dirty="0" smtClean="0"/>
+            <a:endParaRPr lang="de-CH" dirty="0"/>
           </a:p>
           <a:p>
             <a:pPr lvl="1"/>
             <a:r>
-              <a:rPr lang="de-CH" dirty="0" err="1" smtClean="0"/>
+              <a:rPr lang="de-CH" dirty="0" err="1"/>
               <a:t>Timeboxed</a:t>
             </a:r>
             <a:r>
-              <a:rPr lang="de-CH" dirty="0" smtClean="0"/>
+              <a:rPr lang="de-CH" dirty="0"/>
               <a:t> in </a:t>
             </a:r>
             <a:r>
-              <a:rPr lang="de-CH" dirty="0" err="1" smtClean="0"/>
+              <a:rPr lang="de-CH" dirty="0" err="1"/>
               <a:t>class</a:t>
             </a:r>
             <a:r>
@@ -7540,33 +7482,33 @@
               <a:t> </a:t>
             </a:r>
             <a:r>
-              <a:rPr lang="de-CH" dirty="0" err="1" smtClean="0"/>
+              <a:rPr lang="de-CH" dirty="0" err="1"/>
               <a:t>till</a:t>
             </a:r>
             <a:r>
-              <a:rPr lang="de-CH" dirty="0" smtClean="0"/>
+              <a:rPr lang="de-CH" dirty="0"/>
               <a:t> </a:t>
             </a:r>
             <a:r>
-              <a:rPr lang="de-CH" dirty="0" err="1" smtClean="0"/>
+              <a:rPr lang="de-CH" dirty="0" err="1"/>
               <a:t>deadline</a:t>
             </a:r>
             <a:r>
-              <a:rPr lang="de-CH" dirty="0" smtClean="0"/>
+              <a:rPr lang="de-CH" dirty="0"/>
               <a:t> on 30.03. (</a:t>
             </a:r>
             <a:r>
-              <a:rPr lang="de-CH" dirty="0" err="1" smtClean="0"/>
+              <a:rPr lang="de-CH" dirty="0" err="1"/>
               <a:t>today</a:t>
             </a:r>
             <a:r>
-              <a:rPr lang="de-CH" dirty="0" smtClean="0"/>
+              <a:rPr lang="de-CH" dirty="0"/>
               <a:t>)</a:t>
             </a:r>
           </a:p>
           <a:p>
             <a:pPr lvl="1"/>
-            <a:endParaRPr lang="de-CH" dirty="0" smtClean="0"/>
+            <a:endParaRPr lang="de-CH" dirty="0"/>
           </a:p>
           <a:p>
             <a:endParaRPr lang="de-CH" dirty="0"/>
@@ -7583,13 +7525,6 @@
   <p:clrMapOvr>
     <a:masterClrMapping/>
   </p:clrMapOvr>
-  <p:timing>
-    <p:tnLst>
-      <p:par>
-        <p:cTn id="1" dur="indefinite" restart="never" nodeType="tmRoot"/>
-      </p:par>
-    </p:tnLst>
-  </p:timing>
 </p:sld>
 </file>
 
@@ -7626,18 +7561,17 @@
           <a:lstStyle/>
           <a:p>
             <a:r>
-              <a:rPr lang="de-CH" dirty="0" smtClean="0"/>
+              <a:rPr lang="de-CH" dirty="0"/>
               <a:t>Project </a:t>
             </a:r>
             <a:r>
-              <a:rPr lang="de-CH" dirty="0" err="1" smtClean="0"/>
+              <a:rPr lang="de-CH" dirty="0" err="1"/>
               <a:t>Scope</a:t>
             </a:r>
             <a:r>
-              <a:rPr lang="de-CH" dirty="0" smtClean="0"/>
+              <a:rPr lang="de-CH" dirty="0"/>
               <a:t> – Iteration #1</a:t>
             </a:r>
-            <a:endParaRPr lang="de-CH" dirty="0"/>
           </a:p>
         </p:txBody>
       </p:sp>
@@ -7657,7 +7591,7 @@
           <a:lstStyle/>
           <a:p>
             <a:r>
-              <a:rPr lang="de-CH" b="1" dirty="0" smtClean="0"/>
+              <a:rPr lang="de-CH" b="1" dirty="0"/>
               <a:t>Focus</a:t>
             </a:r>
           </a:p>
@@ -7680,18 +7614,18 @@
               <a:t> </a:t>
             </a:r>
             <a:r>
-              <a:rPr lang="de-CH" dirty="0" err="1" smtClean="0"/>
+              <a:rPr lang="de-CH" dirty="0" err="1"/>
               <a:t>client</a:t>
             </a:r>
             <a:r>
-              <a:rPr lang="de-CH" dirty="0" smtClean="0"/>
+              <a:rPr lang="de-CH" dirty="0"/>
               <a:t> </a:t>
             </a:r>
             <a:r>
               <a:rPr lang="de-CH" dirty="0" err="1"/>
               <a:t>visits</a:t>
             </a:r>
-            <a:endParaRPr lang="de-CH" b="1" dirty="0" smtClean="0"/>
+            <a:endParaRPr lang="de-CH" b="1" dirty="0"/>
           </a:p>
           <a:p>
             <a:pPr lvl="1"/>
@@ -7699,22 +7633,22 @@
           </a:p>
           <a:p>
             <a:r>
-              <a:rPr lang="de-CH" b="1" dirty="0" smtClean="0"/>
+              <a:rPr lang="de-CH" b="1" dirty="0"/>
               <a:t>Out </a:t>
             </a:r>
             <a:r>
-              <a:rPr lang="de-CH" b="1" dirty="0" err="1" smtClean="0"/>
+              <a:rPr lang="de-CH" b="1" dirty="0" err="1"/>
               <a:t>of</a:t>
             </a:r>
             <a:r>
-              <a:rPr lang="de-CH" b="1" dirty="0" smtClean="0"/>
+              <a:rPr lang="de-CH" b="1" dirty="0"/>
               <a:t> </a:t>
             </a:r>
             <a:r>
-              <a:rPr lang="de-CH" b="1" dirty="0" err="1" smtClean="0"/>
+              <a:rPr lang="de-CH" b="1" dirty="0" err="1"/>
               <a:t>scope</a:t>
             </a:r>
-            <a:endParaRPr lang="de-CH" b="1" dirty="0" smtClean="0"/>
+            <a:endParaRPr lang="de-CH" b="1" dirty="0"/>
           </a:p>
           <a:p>
             <a:pPr lvl="1"/>
@@ -7727,10 +7661,10 @@
               <a:t> </a:t>
             </a:r>
             <a:r>
-              <a:rPr lang="de-CH" dirty="0" err="1" smtClean="0"/>
+              <a:rPr lang="de-CH" dirty="0" err="1"/>
               <a:t>management</a:t>
             </a:r>
-            <a:endParaRPr lang="de-CH" dirty="0" smtClean="0"/>
+            <a:endParaRPr lang="de-CH" dirty="0"/>
           </a:p>
           <a:p>
             <a:pPr lvl="1"/>
@@ -7751,10 +7685,10 @@
               <a:t> </a:t>
             </a:r>
             <a:r>
-              <a:rPr lang="de-CH" dirty="0" err="1" smtClean="0"/>
+              <a:rPr lang="de-CH" dirty="0" err="1"/>
               <a:t>appointments</a:t>
             </a:r>
-            <a:endParaRPr lang="de-CH" dirty="0" smtClean="0"/>
+            <a:endParaRPr lang="de-CH" dirty="0"/>
           </a:p>
           <a:p>
             <a:pPr lvl="1"/>
@@ -7784,13 +7718,6 @@
   <p:clrMapOvr>
     <a:masterClrMapping/>
   </p:clrMapOvr>
-  <p:timing>
-    <p:tnLst>
-      <p:par>
-        <p:cTn id="1" dur="indefinite" restart="never" nodeType="tmRoot"/>
-      </p:par>
-    </p:tnLst>
-  </p:timing>
 </p:sld>
 </file>
 
@@ -7827,215 +7754,210 @@
           <a:lstStyle/>
           <a:p>
             <a:r>
-              <a:rPr lang="de-CH" dirty="0" smtClean="0"/>
+              <a:rPr lang="de-CH" dirty="0"/>
               <a:t>Research / Interviews</a:t>
             </a:r>
+          </a:p>
+        </p:txBody>
+      </p:sp>
+      <p:sp>
+        <p:nvSpPr>
+          <p:cNvPr id="3" name="Inhaltsplatzhalter 2"/>
+          <p:cNvSpPr>
+            <a:spLocks noGrp="1"/>
+          </p:cNvSpPr>
+          <p:nvPr>
+            <p:ph idx="1"/>
+          </p:nvPr>
+        </p:nvSpPr>
+        <p:spPr/>
+        <p:txBody>
+          <a:bodyPr/>
+          <a:lstStyle/>
+          <a:p>
+            <a:r>
+              <a:rPr lang="de-CH" b="1" dirty="0"/>
+              <a:t>Interviews</a:t>
+            </a:r>
+          </a:p>
+          <a:p>
+            <a:pPr lvl="1"/>
+            <a:r>
+              <a:rPr lang="de-CH" dirty="0" err="1"/>
+              <a:t>persons</a:t>
+            </a:r>
+            <a:r>
+              <a:rPr lang="de-CH" dirty="0"/>
+              <a:t> </a:t>
+            </a:r>
+            <a:r>
+              <a:rPr lang="de-CH" dirty="0" err="1"/>
+              <a:t>working</a:t>
+            </a:r>
+            <a:r>
+              <a:rPr lang="de-CH" dirty="0"/>
+              <a:t> </a:t>
+            </a:r>
+            <a:r>
+              <a:rPr lang="de-CH" dirty="0" err="1"/>
+              <a:t>for</a:t>
+            </a:r>
+            <a:r>
+              <a:rPr lang="de-CH" dirty="0"/>
+              <a:t> Spitex</a:t>
+            </a:r>
+          </a:p>
+          <a:p>
+            <a:pPr lvl="1"/>
+            <a:r>
+              <a:rPr lang="de-CH" dirty="0"/>
+              <a:t>16 </a:t>
+            </a:r>
+            <a:r>
+              <a:rPr lang="de-CH" dirty="0" err="1"/>
+              <a:t>questions</a:t>
+            </a:r>
+            <a:r>
+              <a:rPr lang="de-CH" dirty="0"/>
+              <a:t> ~ 30min</a:t>
+            </a:r>
+          </a:p>
+          <a:p>
             <a:endParaRPr lang="de-CH" dirty="0"/>
           </a:p>
-        </p:txBody>
-      </p:sp>
-      <p:sp>
-        <p:nvSpPr>
-          <p:cNvPr id="3" name="Inhaltsplatzhalter 2"/>
-          <p:cNvSpPr>
-            <a:spLocks noGrp="1"/>
-          </p:cNvSpPr>
-          <p:nvPr>
-            <p:ph idx="1"/>
-          </p:nvPr>
-        </p:nvSpPr>
-        <p:spPr/>
-        <p:txBody>
-          <a:bodyPr/>
-          <a:lstStyle/>
-          <a:p>
-            <a:r>
-              <a:rPr lang="de-CH" b="1" dirty="0" smtClean="0"/>
-              <a:t>Interviews</a:t>
-            </a:r>
+          <a:p>
+            <a:r>
+              <a:rPr lang="de-CH" b="1" dirty="0" err="1"/>
+              <a:t>Findings</a:t>
+            </a:r>
+            <a:endParaRPr lang="de-CH" b="1" dirty="0"/>
           </a:p>
           <a:p>
             <a:pPr lvl="1"/>
             <a:r>
               <a:rPr lang="de-CH" dirty="0" err="1"/>
-              <a:t>p</a:t>
-            </a:r>
-            <a:r>
-              <a:rPr lang="de-CH" dirty="0" err="1" smtClean="0"/>
-              <a:t>ersons</a:t>
-            </a:r>
-            <a:r>
-              <a:rPr lang="de-CH" dirty="0" smtClean="0"/>
+              <a:t>every</a:t>
+            </a:r>
+            <a:r>
+              <a:rPr lang="de-CH" dirty="0"/>
               <a:t> </a:t>
             </a:r>
             <a:r>
-              <a:rPr lang="de-CH" dirty="0" err="1" smtClean="0"/>
-              <a:t>working</a:t>
-            </a:r>
-            <a:r>
-              <a:rPr lang="de-CH" dirty="0" smtClean="0"/>
+              <a:rPr lang="de-CH" dirty="0" err="1"/>
+              <a:t>workstep</a:t>
+            </a:r>
+            <a:r>
+              <a:rPr lang="de-CH" dirty="0"/>
               <a:t> </a:t>
             </a:r>
             <a:r>
-              <a:rPr lang="de-CH" dirty="0" err="1" smtClean="0"/>
+              <a:rPr lang="de-CH" dirty="0" err="1"/>
+              <a:t>is</a:t>
+            </a:r>
+            <a:r>
+              <a:rPr lang="de-CH" dirty="0"/>
+              <a:t> </a:t>
+            </a:r>
+            <a:r>
+              <a:rPr lang="de-CH" dirty="0" err="1"/>
+              <a:t>bound</a:t>
+            </a:r>
+            <a:r>
+              <a:rPr lang="de-CH" dirty="0"/>
+              <a:t> </a:t>
+            </a:r>
+            <a:r>
+              <a:rPr lang="de-CH" dirty="0" err="1"/>
+              <a:t>to</a:t>
+            </a:r>
+            <a:r>
+              <a:rPr lang="de-CH" dirty="0"/>
+              <a:t> a </a:t>
+            </a:r>
+            <a:r>
+              <a:rPr lang="de-CH" dirty="0" err="1"/>
+              <a:t>service</a:t>
+            </a:r>
+            <a:endParaRPr lang="de-CH" dirty="0"/>
+          </a:p>
+          <a:p>
+            <a:pPr lvl="1"/>
+            <a:r>
+              <a:rPr lang="de-CH" dirty="0" err="1"/>
+              <a:t>special</a:t>
+            </a:r>
+            <a:r>
+              <a:rPr lang="de-CH" dirty="0"/>
+              <a:t> </a:t>
+            </a:r>
+            <a:r>
+              <a:rPr lang="de-CH" dirty="0" err="1"/>
+              <a:t>health</a:t>
+            </a:r>
+            <a:r>
+              <a:rPr lang="de-CH" dirty="0"/>
+              <a:t> care </a:t>
+            </a:r>
+            <a:r>
+              <a:rPr lang="de-CH" dirty="0" err="1"/>
+              <a:t>teams</a:t>
+            </a:r>
+            <a:endParaRPr lang="de-CH" dirty="0"/>
+          </a:p>
+          <a:p>
+            <a:pPr lvl="1"/>
+            <a:r>
+              <a:rPr lang="de-CH" dirty="0" err="1"/>
+              <a:t>create</a:t>
+            </a:r>
+            <a:r>
+              <a:rPr lang="de-CH" dirty="0"/>
+              <a:t> a </a:t>
+            </a:r>
+            <a:r>
+              <a:rPr lang="de-CH" dirty="0" err="1"/>
+              <a:t>journal</a:t>
+            </a:r>
+            <a:r>
+              <a:rPr lang="de-CH" dirty="0"/>
+              <a:t> </a:t>
+            </a:r>
+            <a:r>
+              <a:rPr lang="de-CH" dirty="0" err="1"/>
               <a:t>for</a:t>
             </a:r>
             <a:r>
-              <a:rPr lang="de-CH" dirty="0" smtClean="0"/>
-              <a:t> Spitex</a:t>
+              <a:rPr lang="de-CH" dirty="0"/>
+              <a:t> </a:t>
+            </a:r>
+            <a:r>
+              <a:rPr lang="de-CH" dirty="0" err="1"/>
+              <a:t>every</a:t>
+            </a:r>
+            <a:r>
+              <a:rPr lang="de-CH" dirty="0"/>
+              <a:t> </a:t>
+            </a:r>
+            <a:r>
+              <a:rPr lang="de-CH" dirty="0" err="1"/>
+              <a:t>visit</a:t>
+            </a:r>
+            <a:r>
+              <a:rPr lang="de-CH" dirty="0"/>
+              <a:t> (</a:t>
+            </a:r>
+            <a:r>
+              <a:rPr lang="de-CH" dirty="0" err="1"/>
+              <a:t>Kardex</a:t>
+            </a:r>
+            <a:r>
+              <a:rPr lang="de-CH" dirty="0"/>
+              <a:t>)</a:t>
             </a:r>
           </a:p>
           <a:p>
             <a:pPr lvl="1"/>
-            <a:r>
-              <a:rPr lang="de-CH" dirty="0" smtClean="0"/>
-              <a:t>16 </a:t>
-            </a:r>
-            <a:r>
-              <a:rPr lang="de-CH" dirty="0" err="1" smtClean="0"/>
-              <a:t>questions</a:t>
-            </a:r>
-            <a:r>
-              <a:rPr lang="de-CH" dirty="0" smtClean="0"/>
-              <a:t> ~ 30min</a:t>
-            </a:r>
-          </a:p>
-          <a:p>
             <a:endParaRPr lang="de-CH" dirty="0"/>
-          </a:p>
-          <a:p>
-            <a:r>
-              <a:rPr lang="de-CH" b="1" dirty="0" err="1" smtClean="0"/>
-              <a:t>Findings</a:t>
-            </a:r>
-            <a:endParaRPr lang="de-CH" b="1" dirty="0" smtClean="0"/>
-          </a:p>
-          <a:p>
-            <a:pPr lvl="1"/>
-            <a:r>
-              <a:rPr lang="de-CH" dirty="0" err="1" smtClean="0"/>
-              <a:t>every</a:t>
-            </a:r>
-            <a:r>
-              <a:rPr lang="de-CH" dirty="0" smtClean="0"/>
-              <a:t> </a:t>
-            </a:r>
-            <a:r>
-              <a:rPr lang="de-CH" dirty="0" err="1" smtClean="0"/>
-              <a:t>workstep</a:t>
-            </a:r>
-            <a:r>
-              <a:rPr lang="de-CH" dirty="0" smtClean="0"/>
-              <a:t> </a:t>
-            </a:r>
-            <a:r>
-              <a:rPr lang="de-CH" dirty="0" err="1" smtClean="0"/>
-              <a:t>is</a:t>
-            </a:r>
-            <a:r>
-              <a:rPr lang="de-CH" dirty="0" smtClean="0"/>
-              <a:t> </a:t>
-            </a:r>
-            <a:r>
-              <a:rPr lang="de-CH" dirty="0" err="1" smtClean="0"/>
-              <a:t>bound</a:t>
-            </a:r>
-            <a:r>
-              <a:rPr lang="de-CH" dirty="0" smtClean="0"/>
-              <a:t> </a:t>
-            </a:r>
-            <a:r>
-              <a:rPr lang="de-CH" dirty="0" err="1" smtClean="0"/>
-              <a:t>to</a:t>
-            </a:r>
-            <a:r>
-              <a:rPr lang="de-CH" dirty="0" smtClean="0"/>
-              <a:t> a </a:t>
-            </a:r>
-            <a:r>
-              <a:rPr lang="de-CH" dirty="0" err="1" smtClean="0"/>
-              <a:t>service</a:t>
-            </a:r>
-            <a:endParaRPr lang="de-CH" dirty="0"/>
-          </a:p>
-          <a:p>
-            <a:pPr lvl="1"/>
-            <a:r>
-              <a:rPr lang="de-CH" dirty="0" err="1" smtClean="0"/>
-              <a:t>special</a:t>
-            </a:r>
-            <a:r>
-              <a:rPr lang="de-CH" dirty="0" smtClean="0"/>
-              <a:t> </a:t>
-            </a:r>
-            <a:r>
-              <a:rPr lang="de-CH" dirty="0" err="1" smtClean="0"/>
-              <a:t>health</a:t>
-            </a:r>
-            <a:r>
-              <a:rPr lang="de-CH" dirty="0" smtClean="0"/>
-              <a:t> care </a:t>
-            </a:r>
-            <a:r>
-              <a:rPr lang="de-CH" dirty="0" err="1" smtClean="0"/>
-              <a:t>teams</a:t>
-            </a:r>
-            <a:endParaRPr lang="de-CH" dirty="0" smtClean="0"/>
-          </a:p>
-          <a:p>
-            <a:pPr lvl="1"/>
-            <a:r>
-              <a:rPr lang="de-CH" dirty="0" err="1" smtClean="0"/>
-              <a:t>create</a:t>
-            </a:r>
-            <a:r>
-              <a:rPr lang="de-CH" dirty="0" smtClean="0"/>
-              <a:t> a </a:t>
-            </a:r>
-            <a:r>
-              <a:rPr lang="de-CH" dirty="0" err="1" smtClean="0"/>
-              <a:t>journal</a:t>
-            </a:r>
-            <a:r>
-              <a:rPr lang="de-CH" dirty="0" smtClean="0"/>
-              <a:t> </a:t>
-            </a:r>
-            <a:r>
-              <a:rPr lang="de-CH" dirty="0" err="1" smtClean="0"/>
-              <a:t>for</a:t>
-            </a:r>
-            <a:r>
-              <a:rPr lang="de-CH" dirty="0" smtClean="0"/>
-              <a:t> </a:t>
-            </a:r>
-            <a:r>
-              <a:rPr lang="de-CH" dirty="0" err="1" smtClean="0"/>
-              <a:t>every</a:t>
-            </a:r>
-            <a:r>
-              <a:rPr lang="de-CH" dirty="0" smtClean="0"/>
-              <a:t> </a:t>
-            </a:r>
-            <a:r>
-              <a:rPr lang="de-CH" dirty="0" err="1" smtClean="0"/>
-              <a:t>visit</a:t>
-            </a:r>
-            <a:r>
-              <a:rPr lang="de-CH" dirty="0" smtClean="0"/>
-              <a:t> (</a:t>
-            </a:r>
-            <a:r>
-              <a:rPr lang="de-CH" dirty="0" err="1" smtClean="0"/>
-              <a:t>Kardex</a:t>
-            </a:r>
-            <a:r>
-              <a:rPr lang="de-CH" dirty="0" smtClean="0"/>
-              <a:t>)</a:t>
-            </a:r>
-          </a:p>
-          <a:p>
-            <a:pPr lvl="1"/>
-            <a:endParaRPr lang="de-CH" dirty="0" smtClean="0"/>
           </a:p>
         </p:txBody>
       </p:sp>
@@ -8049,13 +7971,6 @@
   <p:clrMapOvr>
     <a:masterClrMapping/>
   </p:clrMapOvr>
-  <p:timing>
-    <p:tnLst>
-      <p:par>
-        <p:cTn id="1" dur="indefinite" restart="never" nodeType="tmRoot"/>
-      </p:par>
-    </p:tnLst>
-  </p:timing>
 </p:sld>
 </file>
 
@@ -8100,7 +8015,7 @@
               <a:t> / </a:t>
             </a:r>
             <a:r>
-              <a:rPr lang="de-CH" dirty="0" err="1" smtClean="0"/>
+              <a:rPr lang="de-CH" dirty="0" err="1"/>
               <a:t>Personae</a:t>
             </a:r>
             <a:endParaRPr lang="de-CH" dirty="0"/>
@@ -8123,74 +8038,56 @@
           <a:lstStyle/>
           <a:p>
             <a:r>
-              <a:rPr lang="de-CH" dirty="0" err="1" smtClean="0"/>
+              <a:rPr lang="de-CH" dirty="0" err="1"/>
               <a:t>Created</a:t>
             </a:r>
             <a:r>
-              <a:rPr lang="de-CH" dirty="0" smtClean="0"/>
+              <a:rPr lang="de-CH" dirty="0"/>
               <a:t> </a:t>
             </a:r>
             <a:r>
-              <a:rPr lang="de-CH" dirty="0" err="1" smtClean="0"/>
+              <a:rPr lang="de-CH" dirty="0" err="1"/>
               <a:t>three</a:t>
             </a:r>
             <a:r>
-              <a:rPr lang="de-CH" dirty="0" smtClean="0"/>
+              <a:rPr lang="de-CH" dirty="0"/>
               <a:t> different </a:t>
             </a:r>
             <a:r>
-              <a:rPr lang="de-CH" dirty="0" err="1" smtClean="0"/>
+              <a:rPr lang="de-CH" dirty="0" err="1"/>
               <a:t>personae</a:t>
             </a:r>
-            <a:endParaRPr lang="de-CH" dirty="0" smtClean="0"/>
+            <a:endParaRPr lang="de-CH" dirty="0"/>
           </a:p>
           <a:p>
             <a:pPr lvl="1"/>
             <a:r>
-              <a:rPr lang="de-CH" dirty="0" smtClean="0"/>
-              <a:t>Gertrud</a:t>
-            </a:r>
-            <a:r>
-              <a:rPr lang="de-CH" dirty="0"/>
-              <a:t>, 62 </a:t>
-            </a:r>
-            <a:r>
-              <a:rPr lang="de-CH" dirty="0" err="1" smtClean="0"/>
+              <a:rPr lang="de-CH" dirty="0"/>
+              <a:t>Gertrud, 62 </a:t>
+            </a:r>
+            <a:r>
+              <a:rPr lang="de-CH" dirty="0" err="1"/>
               <a:t>yo</a:t>
             </a:r>
             <a:r>
-              <a:rPr lang="de-CH" dirty="0" smtClean="0"/>
-              <a:t> / </a:t>
-            </a:r>
-            <a:r>
-              <a:rPr lang="de-CH" dirty="0"/>
-              <a:t>Spitex Betreuerin </a:t>
-            </a:r>
-            <a:endParaRPr lang="de-CH" dirty="0" smtClean="0"/>
+              <a:rPr lang="de-CH" dirty="0"/>
+              <a:t> / Spitex Betreuerin </a:t>
+            </a:r>
           </a:p>
           <a:p>
             <a:pPr lvl="1"/>
             <a:r>
               <a:rPr lang="de-CH" dirty="0"/>
-              <a:t>Laura, </a:t>
-            </a:r>
-            <a:r>
-              <a:rPr lang="de-CH" dirty="0" smtClean="0"/>
-              <a:t>51 </a:t>
-            </a:r>
-            <a:r>
-              <a:rPr lang="de-CH" dirty="0" err="1" smtClean="0"/>
+              <a:t>Laura, 51 </a:t>
+            </a:r>
+            <a:r>
+              <a:rPr lang="de-CH" dirty="0" err="1"/>
               <a:t>yo</a:t>
             </a:r>
             <a:r>
-              <a:rPr lang="de-CH" dirty="0" smtClean="0"/>
-              <a:t> / </a:t>
-            </a:r>
-            <a:r>
-              <a:rPr lang="de-CH" dirty="0"/>
-              <a:t>Spitex-Mitarbeiter Fachperson Depression </a:t>
-            </a:r>
-            <a:endParaRPr lang="de-CH" dirty="0" smtClean="0"/>
+              <a:rPr lang="de-CH" dirty="0"/>
+              <a:t> / Spitex-Mitarbeiter Fachperson Depression </a:t>
+            </a:r>
           </a:p>
           <a:p>
             <a:pPr lvl="1"/>
@@ -8199,18 +8096,13 @@
               <a:t>Max, 21 </a:t>
             </a:r>
             <a:r>
-              <a:rPr lang="de-CH" dirty="0" err="1" smtClean="0"/>
+              <a:rPr lang="de-CH" dirty="0" err="1"/>
               <a:t>yo</a:t>
             </a:r>
             <a:r>
-              <a:rPr lang="de-CH" dirty="0" smtClean="0"/>
-              <a:t> / </a:t>
-            </a:r>
-            <a:r>
-              <a:rPr lang="de-CH" dirty="0"/>
-              <a:t>Aushilfs-Pfleger, Zivildienst </a:t>
-            </a:r>
-            <a:endParaRPr lang="de-CH" dirty="0"/>
+              <a:rPr lang="de-CH" dirty="0"/>
+              <a:t> / Aushilfs-Pfleger, Zivildienst </a:t>
+            </a:r>
           </a:p>
         </p:txBody>
       </p:sp>
@@ -8224,13 +8116,6 @@
   <p:clrMapOvr>
     <a:masterClrMapping/>
   </p:clrMapOvr>
-  <p:timing>
-    <p:tnLst>
-      <p:par>
-        <p:cTn id="1" dur="indefinite" restart="never" nodeType="tmRoot"/>
-      </p:par>
-    </p:tnLst>
-  </p:timing>
 </p:sld>
 </file>
 
@@ -8267,10 +8152,9 @@
           <a:lstStyle/>
           <a:p>
             <a:r>
-              <a:rPr lang="de-CH" dirty="0" smtClean="0"/>
+              <a:rPr lang="de-CH" dirty="0"/>
               <a:t>Persona - Gertrud</a:t>
             </a:r>
-            <a:endParaRPr lang="de-CH" dirty="0"/>
           </a:p>
         </p:txBody>
       </p:sp>
@@ -8297,19 +8181,18 @@
               <a:rPr lang="de-CH" dirty="0"/>
               <a:t>Da sein für Ihre Klienten und Sie auf dem Weg der Genesung bestmöglich unterstützen, einen Nebenjob mit weniger Stress Ausführen, Menschenkontakt haben </a:t>
             </a:r>
-            <a:endParaRPr lang="de-CH" dirty="0" smtClean="0"/>
-          </a:p>
-          <a:p>
-            <a:r>
-              <a:rPr lang="de-CH" b="1" dirty="0" err="1" smtClean="0"/>
+          </a:p>
+          <a:p>
+            <a:r>
+              <a:rPr lang="de-CH" b="1" dirty="0" err="1"/>
               <a:t>Pain</a:t>
             </a:r>
             <a:r>
-              <a:rPr lang="de-CH" b="1" dirty="0" smtClean="0"/>
+              <a:rPr lang="de-CH" b="1" dirty="0"/>
               <a:t> </a:t>
             </a:r>
             <a:r>
-              <a:rPr lang="de-CH" b="1" dirty="0" err="1" smtClean="0"/>
+              <a:rPr lang="de-CH" b="1" dirty="0" err="1"/>
               <a:t>points</a:t>
             </a:r>
             <a:r>
@@ -8320,14 +8203,13 @@
               <a:rPr lang="de-CH" dirty="0"/>
               <a:t>Da Sie nur Teilzeit arbeitet hat Sie oft das Gefühl Sachen zu verpassen </a:t>
             </a:r>
-            <a:endParaRPr lang="de-CH" dirty="0" smtClean="0"/>
           </a:p>
           <a:p>
             <a:endParaRPr lang="de-CH" dirty="0"/>
           </a:p>
           <a:p>
             <a:r>
-              <a:rPr lang="de-CH" b="1" dirty="0" smtClean="0"/>
+              <a:rPr lang="de-CH" b="1" dirty="0"/>
               <a:t>Statements</a:t>
             </a:r>
           </a:p>
@@ -8411,10 +8293,45 @@
               <a:rPr lang="de-CH" dirty="0"/>
               <a:t>nicht andere Leute damit stören muss. </a:t>
             </a:r>
-            <a:endParaRPr lang="de-CH" dirty="0"/>
-          </a:p>
-        </p:txBody>
-      </p:sp>
+          </a:p>
+        </p:txBody>
+      </p:sp>
+      <p:pic>
+        <p:nvPicPr>
+          <p:cNvPr id="5" name="Grafik 4" descr="Ein Bild, das Person, tragen, lächelnd, darstellend enthält.&#10;&#10;Automatisch generierte Beschreibung">
+            <a:extLst>
+              <a:ext uri="{FF2B5EF4-FFF2-40B4-BE49-F238E27FC236}">
+                <a16:creationId xmlns:a16="http://schemas.microsoft.com/office/drawing/2014/main" id="{01180396-C2F3-4804-9EB0-3F32431141BD}"/>
+              </a:ext>
+            </a:extLst>
+          </p:cNvPr>
+          <p:cNvPicPr>
+            <a:picLocks noChangeAspect="1"/>
+          </p:cNvPicPr>
+          <p:nvPr/>
+        </p:nvPicPr>
+        <p:blipFill>
+          <a:blip r:embed="rId2" cstate="print">
+            <a:extLst>
+              <a:ext uri="{28A0092B-C50C-407E-A947-70E740481C1C}">
+                <a14:useLocalDpi xmlns:a14="http://schemas.microsoft.com/office/drawing/2010/main" val="0"/>
+              </a:ext>
+            </a:extLst>
+          </a:blip>
+          <a:stretch>
+            <a:fillRect/>
+          </a:stretch>
+        </p:blipFill>
+        <p:spPr>
+          <a:xfrm>
+            <a:off x="10378225" y="702156"/>
+            <a:ext cx="1013800" cy="1013800"/>
+          </a:xfrm>
+          <a:prstGeom prst="rect">
+            <a:avLst/>
+          </a:prstGeom>
+        </p:spPr>
+      </p:pic>
     </p:spTree>
     <p:extLst>
       <p:ext uri="{BB962C8B-B14F-4D97-AF65-F5344CB8AC3E}">
@@ -8425,13 +8342,6 @@
   <p:clrMapOvr>
     <a:masterClrMapping/>
   </p:clrMapOvr>
-  <p:timing>
-    <p:tnLst>
-      <p:par>
-        <p:cTn id="1" dur="indefinite" restart="never" nodeType="tmRoot"/>
-      </p:par>
-    </p:tnLst>
-  </p:timing>
 </p:sld>
 </file>
 
@@ -8469,13 +8379,8 @@
           <a:p>
             <a:r>
               <a:rPr lang="de-CH" dirty="0"/>
-              <a:t>Persona - </a:t>
-            </a:r>
-            <a:r>
-              <a:rPr lang="de-CH" dirty="0" smtClean="0"/>
-              <a:t>Laura</a:t>
-            </a:r>
-            <a:endParaRPr lang="de-CH" dirty="0"/>
+              <a:t>Persona - Laura</a:t>
+            </a:r>
           </a:p>
         </p:txBody>
       </p:sp>
@@ -8502,19 +8407,18 @@
               <a:rPr lang="de-CH" dirty="0"/>
               <a:t>Übersichtliche Dokumentation über Zustand des Patienten </a:t>
             </a:r>
-            <a:endParaRPr lang="de-CH" dirty="0" smtClean="0"/>
-          </a:p>
-          <a:p>
-            <a:r>
-              <a:rPr lang="de-CH" b="1" dirty="0" err="1" smtClean="0"/>
+          </a:p>
+          <a:p>
+            <a:r>
+              <a:rPr lang="de-CH" b="1" dirty="0" err="1"/>
               <a:t>Pain</a:t>
             </a:r>
             <a:r>
-              <a:rPr lang="de-CH" b="1" dirty="0" smtClean="0"/>
+              <a:rPr lang="de-CH" b="1" dirty="0"/>
               <a:t> </a:t>
             </a:r>
             <a:r>
-              <a:rPr lang="de-CH" b="1" dirty="0" err="1" smtClean="0"/>
+              <a:rPr lang="de-CH" b="1" dirty="0" err="1"/>
               <a:t>points</a:t>
             </a:r>
             <a:r>
@@ -8525,17 +8429,15 @@
               <a:rPr lang="de-CH" dirty="0"/>
               <a:t>Mühsames Tippen in grosse Textfelder </a:t>
             </a:r>
-            <a:endParaRPr lang="de-CH" dirty="0" smtClean="0"/>
-          </a:p>
-          <a:p>
-            <a:endParaRPr lang="de-CH" dirty="0" smtClean="0"/>
-          </a:p>
-          <a:p>
-            <a:r>
-              <a:rPr lang="de-CH" b="1" dirty="0" smtClean="0"/>
+          </a:p>
+          <a:p>
+            <a:endParaRPr lang="de-CH" dirty="0"/>
+          </a:p>
+          <a:p>
+            <a:r>
+              <a:rPr lang="de-CH" b="1" dirty="0"/>
               <a:t>Statements</a:t>
             </a:r>
-            <a:endParaRPr lang="de-CH" b="1" dirty="0"/>
           </a:p>
           <a:p>
             <a:pPr lvl="1"/>
@@ -8617,10 +8519,45 @@
               <a:rPr lang="de-CH" dirty="0"/>
               <a:t>mir einen möglichst schnell einen Überblick über einen neuzugewiesenen Klienten machen kann. </a:t>
             </a:r>
-            <a:endParaRPr lang="de-CH" dirty="0"/>
-          </a:p>
-        </p:txBody>
-      </p:sp>
+          </a:p>
+        </p:txBody>
+      </p:sp>
+      <p:pic>
+        <p:nvPicPr>
+          <p:cNvPr id="5" name="Grafik 4" descr="Ein Bild, das Person, Kleidung, Frau, lächelnd enthält.&#10;&#10;Automatisch generierte Beschreibung">
+            <a:extLst>
+              <a:ext uri="{FF2B5EF4-FFF2-40B4-BE49-F238E27FC236}">
+                <a16:creationId xmlns:a16="http://schemas.microsoft.com/office/drawing/2014/main" id="{4C3E666B-963C-4111-AB53-4B2C9EB5664E}"/>
+              </a:ext>
+            </a:extLst>
+          </p:cNvPr>
+          <p:cNvPicPr>
+            <a:picLocks noChangeAspect="1"/>
+          </p:cNvPicPr>
+          <p:nvPr/>
+        </p:nvPicPr>
+        <p:blipFill>
+          <a:blip r:embed="rId2">
+            <a:extLst>
+              <a:ext uri="{28A0092B-C50C-407E-A947-70E740481C1C}">
+                <a14:useLocalDpi xmlns:a14="http://schemas.microsoft.com/office/drawing/2010/main" val="0"/>
+              </a:ext>
+            </a:extLst>
+          </a:blip>
+          <a:stretch>
+            <a:fillRect/>
+          </a:stretch>
+        </p:blipFill>
+        <p:spPr>
+          <a:xfrm>
+            <a:off x="10469905" y="750074"/>
+            <a:ext cx="965882" cy="965882"/>
+          </a:xfrm>
+          <a:prstGeom prst="rect">
+            <a:avLst/>
+          </a:prstGeom>
+        </p:spPr>
+      </p:pic>
     </p:spTree>
     <p:extLst>
       <p:ext uri="{BB962C8B-B14F-4D97-AF65-F5344CB8AC3E}">
@@ -8631,13 +8568,6 @@
   <p:clrMapOvr>
     <a:masterClrMapping/>
   </p:clrMapOvr>
-  <p:timing>
-    <p:tnLst>
-      <p:par>
-        <p:cTn id="1" dur="indefinite" restart="never" nodeType="tmRoot"/>
-      </p:par>
-    </p:tnLst>
-  </p:timing>
 </p:sld>
 </file>
 

</xml_diff>